<commit_message>
Modelo logico e Conceitual atualizados
</commit_message>
<xml_diff>
--- a/Projeto1luminosidade.pptx
+++ b/Projeto1luminosidade.pptx
@@ -5,7 +5,7 @@
     <p:sldMasterId id="2147483648" r:id="rId1"/>
   </p:sldMasterIdLst>
   <p:notesMasterIdLst>
-    <p:notesMasterId r:id="rId15"/>
+    <p:notesMasterId r:id="rId16"/>
   </p:notesMasterIdLst>
   <p:sldIdLst>
     <p:sldId id="256" r:id="rId2"/>
@@ -15,12 +15,13 @@
     <p:sldId id="259" r:id="rId6"/>
     <p:sldId id="260" r:id="rId7"/>
     <p:sldId id="268" r:id="rId8"/>
-    <p:sldId id="269" r:id="rId9"/>
-    <p:sldId id="261" r:id="rId10"/>
+    <p:sldId id="261" r:id="rId9"/>
+    <p:sldId id="269" r:id="rId10"/>
     <p:sldId id="262" r:id="rId11"/>
-    <p:sldId id="264" r:id="rId12"/>
-    <p:sldId id="265" r:id="rId13"/>
-    <p:sldId id="266" r:id="rId14"/>
+    <p:sldId id="270" r:id="rId12"/>
+    <p:sldId id="266" r:id="rId13"/>
+    <p:sldId id="264" r:id="rId14"/>
+    <p:sldId id="265" r:id="rId15"/>
   </p:sldIdLst>
   <p:sldSz cx="12192000" cy="6858000"/>
   <p:notesSz cx="6858000" cy="9144000"/>
@@ -139,20 +140,6 @@
 </p:cmAuthorLst>
 </file>
 
-<file path=ppt/comments/comment1.xml><?xml version="1.0" encoding="utf-8"?>
-<p:cmLst xmlns:a="http://schemas.openxmlformats.org/drawingml/2006/main" xmlns:r="http://schemas.openxmlformats.org/officeDocument/2006/relationships" xmlns:p="http://schemas.openxmlformats.org/presentationml/2006/main">
-  <p:cm authorId="1" dt="2020-04-20T22:45:51.088" idx="1">
-    <p:pos x="10" y="10"/>
-    <p:text>aqui será o LLD</p:text>
-    <p:extLst>
-      <p:ext uri="{C676402C-5697-4E1C-873F-D02D1690AC5C}">
-        <p15:threadingInfo xmlns:p15="http://schemas.microsoft.com/office/powerpoint/2012/main" timeZoneBias="180"/>
-      </p:ext>
-    </p:extLst>
-  </p:cm>
-</p:cmLst>
-</file>
-
 <file path=ppt/notesMasters/notesMaster1.xml><?xml version="1.0" encoding="utf-8"?>
 <p:notesMaster xmlns:a="http://schemas.openxmlformats.org/drawingml/2006/main" xmlns:r="http://schemas.openxmlformats.org/officeDocument/2006/relationships" xmlns:p="http://schemas.openxmlformats.org/presentationml/2006/main">
   <p:cSld>
@@ -235,7 +222,7 @@
           <a:p>
             <a:fld id="{655F7DB7-5B35-44EF-86DD-30F04B6260EF}" type="datetimeFigureOut">
               <a:rPr lang="pt-BR" smtClean="0"/>
-              <a:t>23/04/2020</a:t>
+              <a:t>30/04/2020</a:t>
             </a:fld>
             <a:endParaRPr lang="pt-BR"/>
           </a:p>
@@ -649,7 +636,7 @@
           <a:p>
             <a:fld id="{15B003F1-72A3-4565-B369-F67C067E940D}" type="datetimeFigureOut">
               <a:rPr lang="pt-BR" smtClean="0"/>
-              <a:t>23/04/2020</a:t>
+              <a:t>30/04/2020</a:t>
             </a:fld>
             <a:endParaRPr lang="pt-BR"/>
           </a:p>
@@ -850,7 +837,7 @@
           <a:p>
             <a:fld id="{15B003F1-72A3-4565-B369-F67C067E940D}" type="datetimeFigureOut">
               <a:rPr lang="pt-BR" smtClean="0"/>
-              <a:t>23/04/2020</a:t>
+              <a:t>30/04/2020</a:t>
             </a:fld>
             <a:endParaRPr lang="pt-BR"/>
           </a:p>
@@ -1061,7 +1048,7 @@
           <a:p>
             <a:fld id="{15B003F1-72A3-4565-B369-F67C067E940D}" type="datetimeFigureOut">
               <a:rPr lang="pt-BR" smtClean="0"/>
-              <a:t>23/04/2020</a:t>
+              <a:t>30/04/2020</a:t>
             </a:fld>
             <a:endParaRPr lang="pt-BR"/>
           </a:p>
@@ -1262,7 +1249,7 @@
           <a:p>
             <a:fld id="{15B003F1-72A3-4565-B369-F67C067E940D}" type="datetimeFigureOut">
               <a:rPr lang="pt-BR" smtClean="0"/>
-              <a:t>23/04/2020</a:t>
+              <a:t>30/04/2020</a:t>
             </a:fld>
             <a:endParaRPr lang="pt-BR"/>
           </a:p>
@@ -1540,7 +1527,7 @@
           <a:p>
             <a:fld id="{15B003F1-72A3-4565-B369-F67C067E940D}" type="datetimeFigureOut">
               <a:rPr lang="pt-BR" smtClean="0"/>
-              <a:t>23/04/2020</a:t>
+              <a:t>30/04/2020</a:t>
             </a:fld>
             <a:endParaRPr lang="pt-BR"/>
           </a:p>
@@ -1808,7 +1795,7 @@
           <a:p>
             <a:fld id="{15B003F1-72A3-4565-B369-F67C067E940D}" type="datetimeFigureOut">
               <a:rPr lang="pt-BR" smtClean="0"/>
-              <a:t>23/04/2020</a:t>
+              <a:t>30/04/2020</a:t>
             </a:fld>
             <a:endParaRPr lang="pt-BR"/>
           </a:p>
@@ -2223,7 +2210,7 @@
           <a:p>
             <a:fld id="{15B003F1-72A3-4565-B369-F67C067E940D}" type="datetimeFigureOut">
               <a:rPr lang="pt-BR" smtClean="0"/>
-              <a:t>23/04/2020</a:t>
+              <a:t>30/04/2020</a:t>
             </a:fld>
             <a:endParaRPr lang="pt-BR"/>
           </a:p>
@@ -2367,7 +2354,7 @@
           <a:p>
             <a:fld id="{15B003F1-72A3-4565-B369-F67C067E940D}" type="datetimeFigureOut">
               <a:rPr lang="pt-BR" smtClean="0"/>
-              <a:t>23/04/2020</a:t>
+              <a:t>30/04/2020</a:t>
             </a:fld>
             <a:endParaRPr lang="pt-BR"/>
           </a:p>
@@ -2483,7 +2470,7 @@
           <a:p>
             <a:fld id="{15B003F1-72A3-4565-B369-F67C067E940D}" type="datetimeFigureOut">
               <a:rPr lang="pt-BR" smtClean="0"/>
-              <a:t>23/04/2020</a:t>
+              <a:t>30/04/2020</a:t>
             </a:fld>
             <a:endParaRPr lang="pt-BR"/>
           </a:p>
@@ -2797,7 +2784,7 @@
           <a:p>
             <a:fld id="{15B003F1-72A3-4565-B369-F67C067E940D}" type="datetimeFigureOut">
               <a:rPr lang="pt-BR" smtClean="0"/>
-              <a:t>23/04/2020</a:t>
+              <a:t>30/04/2020</a:t>
             </a:fld>
             <a:endParaRPr lang="pt-BR"/>
           </a:p>
@@ -3088,7 +3075,7 @@
           <a:p>
             <a:fld id="{15B003F1-72A3-4565-B369-F67C067E940D}" type="datetimeFigureOut">
               <a:rPr lang="pt-BR" smtClean="0"/>
-              <a:t>23/04/2020</a:t>
+              <a:t>30/04/2020</a:t>
             </a:fld>
             <a:endParaRPr lang="pt-BR"/>
           </a:p>
@@ -3332,7 +3319,7 @@
           <a:p>
             <a:fld id="{15B003F1-72A3-4565-B369-F67C067E940D}" type="datetimeFigureOut">
               <a:rPr lang="pt-BR" smtClean="0"/>
-              <a:t>23/04/2020</a:t>
+              <a:t>30/04/2020</a:t>
             </a:fld>
             <a:endParaRPr lang="pt-BR"/>
           </a:p>
@@ -3738,6 +3725,14 @@
 <file path=ppt/slides/slide1.xml><?xml version="1.0" encoding="utf-8"?>
 <p:sld xmlns:a="http://schemas.openxmlformats.org/drawingml/2006/main" xmlns:r="http://schemas.openxmlformats.org/officeDocument/2006/relationships" xmlns:p="http://schemas.openxmlformats.org/presentationml/2006/main" show="0">
   <p:cSld>
+    <p:bg>
+      <p:bgPr>
+        <a:solidFill>
+          <a:schemeClr val="bg1"/>
+        </a:solidFill>
+        <a:effectLst/>
+      </p:bgPr>
+    </p:bg>
     <p:spTree>
       <p:nvGrpSpPr>
         <p:cNvPr id="1" name=""/>
@@ -3754,24 +3749,41 @@
       </p:grpSpPr>
       <p:sp>
         <p:nvSpPr>
-          <p:cNvPr id="2" name="Retângulo 1">
-            <a:extLst>
-              <a:ext uri="{FF2B5EF4-FFF2-40B4-BE49-F238E27FC236}">
-                <a16:creationId xmlns:a16="http://schemas.microsoft.com/office/drawing/2014/main" id="{13A45D19-4AF4-43E7-B26A-43C019723F7F}"/>
-              </a:ext>
-            </a:extLst>
-          </p:cNvPr>
-          <p:cNvSpPr/>
-          <p:nvPr/>
-        </p:nvSpPr>
-        <p:spPr>
-          <a:xfrm>
-            <a:off x="4784035" y="1404730"/>
-            <a:ext cx="2650435" cy="2318502"/>
+          <p:cNvPr id="24" name="Rectangle 23">
+            <a:extLst>
+              <a:ext uri="{FF2B5EF4-FFF2-40B4-BE49-F238E27FC236}">
+                <a16:creationId xmlns:a16="http://schemas.microsoft.com/office/drawing/2014/main" id="{57845966-6EFC-468A-9CC7-BAB4B95854E7}"/>
+              </a:ext>
+              <a:ext uri="{C183D7F6-B498-43B3-948B-1728B52AA6E4}">
+                <adec:decorative xmlns:adec="http://schemas.microsoft.com/office/drawing/2017/decorative" val="1"/>
+              </a:ext>
+            </a:extLst>
+          </p:cNvPr>
+          <p:cNvSpPr>
+            <a:spLocks noGrp="1" noRot="1" noChangeAspect="1" noMove="1" noResize="1" noEditPoints="1" noAdjustHandles="1" noChangeArrowheads="1" noChangeShapeType="1" noTextEdit="1"/>
+          </p:cNvSpPr>
+          <p:nvPr>
+            <p:extLst>
+              <p:ext uri="{386F3935-93C4-4BCD-93E2-E3B085C9AB24}">
+                <p16:designElem xmlns:p16="http://schemas.microsoft.com/office/powerpoint/2015/main" val="1"/>
+              </p:ext>
+            </p:extLst>
+          </p:nvPr>
+        </p:nvSpPr>
+        <p:spPr>
+          <a:xfrm>
+            <a:off x="1354372" y="0"/>
+            <a:ext cx="9483256" cy="6858000"/>
           </a:xfrm>
           <a:prstGeom prst="rect">
             <a:avLst/>
           </a:prstGeom>
+          <a:solidFill>
+            <a:srgbClr val="6E7342"/>
+          </a:solidFill>
+          <a:ln>
+            <a:noFill/>
+          </a:ln>
         </p:spPr>
         <p:style>
           <a:lnRef idx="2">
@@ -3794,33 +3806,217 @@
           <a:lstStyle/>
           <a:p>
             <a:pPr algn="ctr"/>
-            <a:r>
-              <a:rPr lang="pt-BR" dirty="0"/>
-              <a:t>Será a logo</a:t>
-            </a:r>
-          </a:p>
-        </p:txBody>
-      </p:sp>
-      <p:sp>
-        <p:nvSpPr>
-          <p:cNvPr id="4" name="Retângulo 3">
-            <a:extLst>
-              <a:ext uri="{FF2B5EF4-FFF2-40B4-BE49-F238E27FC236}">
-                <a16:creationId xmlns:a16="http://schemas.microsoft.com/office/drawing/2014/main" id="{2239F476-394A-47D9-82E9-FF61A488EE7F}"/>
-              </a:ext>
-            </a:extLst>
-          </p:cNvPr>
-          <p:cNvSpPr/>
-          <p:nvPr/>
-        </p:nvSpPr>
-        <p:spPr>
-          <a:xfrm>
-            <a:off x="3538329" y="4116530"/>
-            <a:ext cx="5102087" cy="1184340"/>
+            <a:endParaRPr lang="en-US"/>
+          </a:p>
+        </p:txBody>
+      </p:sp>
+      <p:pic>
+        <p:nvPicPr>
+          <p:cNvPr id="26" name="Picture 25">
+            <a:extLst>
+              <a:ext uri="{FF2B5EF4-FFF2-40B4-BE49-F238E27FC236}">
+                <a16:creationId xmlns:a16="http://schemas.microsoft.com/office/drawing/2014/main" id="{75554383-98AF-4A47-BB65-705FAAA4BE6A}"/>
+              </a:ext>
+              <a:ext uri="{C183D7F6-B498-43B3-948B-1728B52AA6E4}">
+                <adec:decorative xmlns:adec="http://schemas.microsoft.com/office/drawing/2017/decorative" val="1"/>
+              </a:ext>
+            </a:extLst>
+          </p:cNvPr>
+          <p:cNvPicPr>
+            <a:picLocks noGrp="1" noRot="1" noChangeAspect="1" noMove="1" noResize="1" noEditPoints="1" noAdjustHandles="1" noChangeArrowheads="1" noChangeShapeType="1" noCrop="1"/>
+          </p:cNvPicPr>
+          <p:nvPr>
+            <p:extLst>
+              <p:ext uri="{386F3935-93C4-4BCD-93E2-E3B085C9AB24}">
+                <p16:designElem xmlns:p16="http://schemas.microsoft.com/office/powerpoint/2015/main" val="1"/>
+              </p:ext>
+            </p:extLst>
+          </p:nvPr>
+        </p:nvPicPr>
+        <p:blipFill>
+          <a:blip r:embed="rId2">
+            <a:extLst>
+              <a:ext uri="{28A0092B-C50C-407E-A947-70E740481C1C}">
+                <a14:useLocalDpi xmlns:a14="http://schemas.microsoft.com/office/drawing/2010/main" val="0"/>
+              </a:ext>
+            </a:extLst>
+          </a:blip>
+          <a:stretch>
+            <a:fillRect/>
+          </a:stretch>
+        </p:blipFill>
+        <p:spPr>
+          <a:xfrm>
+            <a:off x="0" y="0"/>
+            <a:ext cx="12192000" cy="6858000"/>
           </a:xfrm>
           <a:prstGeom prst="rect">
             <a:avLst/>
           </a:prstGeom>
+        </p:spPr>
+      </p:pic>
+      <p:sp>
+        <p:nvSpPr>
+          <p:cNvPr id="28" name="Freeform: Shape 27">
+            <a:extLst>
+              <a:ext uri="{FF2B5EF4-FFF2-40B4-BE49-F238E27FC236}">
+                <a16:creationId xmlns:a16="http://schemas.microsoft.com/office/drawing/2014/main" id="{ADAD1991-FFD1-4E94-ABAB-7560D33008E4}"/>
+              </a:ext>
+              <a:ext uri="{C183D7F6-B498-43B3-948B-1728B52AA6E4}">
+                <adec:decorative xmlns:adec="http://schemas.microsoft.com/office/drawing/2017/decorative" val="1"/>
+              </a:ext>
+            </a:extLst>
+          </p:cNvPr>
+          <p:cNvSpPr>
+            <a:spLocks noGrp="1" noRot="1" noChangeAspect="1" noMove="1" noResize="1" noEditPoints="1" noAdjustHandles="1" noChangeArrowheads="1" noChangeShapeType="1" noTextEdit="1"/>
+          </p:cNvSpPr>
+          <p:nvPr>
+            <p:extLst>
+              <p:ext uri="{386F3935-93C4-4BCD-93E2-E3B085C9AB24}">
+                <p16:designElem xmlns:p16="http://schemas.microsoft.com/office/powerpoint/2015/main" val="1"/>
+              </p:ext>
+            </p:extLst>
+          </p:nvPr>
+        </p:nvSpPr>
+        <p:spPr>
+          <a:xfrm>
+            <a:off x="2144484" y="0"/>
+            <a:ext cx="7837716" cy="6858000"/>
+          </a:xfrm>
+          <a:custGeom>
+            <a:avLst/>
+            <a:gdLst>
+              <a:gd name="connsiteX0" fmla="*/ 2232159 w 7837716"/>
+              <a:gd name="connsiteY0" fmla="*/ 0 h 6858000"/>
+              <a:gd name="connsiteX1" fmla="*/ 5605557 w 7837716"/>
+              <a:gd name="connsiteY1" fmla="*/ 0 h 6858000"/>
+              <a:gd name="connsiteX2" fmla="*/ 5617845 w 7837716"/>
+              <a:gd name="connsiteY2" fmla="*/ 5384 h 6858000"/>
+              <a:gd name="connsiteX3" fmla="*/ 7837716 w 7837716"/>
+              <a:gd name="connsiteY3" fmla="*/ 3429000 h 6858000"/>
+              <a:gd name="connsiteX4" fmla="*/ 5617845 w 7837716"/>
+              <a:gd name="connsiteY4" fmla="*/ 6852616 h 6858000"/>
+              <a:gd name="connsiteX5" fmla="*/ 5605557 w 7837716"/>
+              <a:gd name="connsiteY5" fmla="*/ 6858000 h 6858000"/>
+              <a:gd name="connsiteX6" fmla="*/ 2232159 w 7837716"/>
+              <a:gd name="connsiteY6" fmla="*/ 6858000 h 6858000"/>
+              <a:gd name="connsiteX7" fmla="*/ 2219871 w 7837716"/>
+              <a:gd name="connsiteY7" fmla="*/ 6852616 h 6858000"/>
+              <a:gd name="connsiteX8" fmla="*/ 0 w 7837716"/>
+              <a:gd name="connsiteY8" fmla="*/ 3429000 h 6858000"/>
+              <a:gd name="connsiteX9" fmla="*/ 2219871 w 7837716"/>
+              <a:gd name="connsiteY9" fmla="*/ 5384 h 6858000"/>
+            </a:gdLst>
+            <a:ahLst/>
+            <a:cxnLst>
+              <a:cxn ang="0">
+                <a:pos x="connsiteX0" y="connsiteY0"/>
+              </a:cxn>
+              <a:cxn ang="0">
+                <a:pos x="connsiteX1" y="connsiteY1"/>
+              </a:cxn>
+              <a:cxn ang="0">
+                <a:pos x="connsiteX2" y="connsiteY2"/>
+              </a:cxn>
+              <a:cxn ang="0">
+                <a:pos x="connsiteX3" y="connsiteY3"/>
+              </a:cxn>
+              <a:cxn ang="0">
+                <a:pos x="connsiteX4" y="connsiteY4"/>
+              </a:cxn>
+              <a:cxn ang="0">
+                <a:pos x="connsiteX5" y="connsiteY5"/>
+              </a:cxn>
+              <a:cxn ang="0">
+                <a:pos x="connsiteX6" y="connsiteY6"/>
+              </a:cxn>
+              <a:cxn ang="0">
+                <a:pos x="connsiteX7" y="connsiteY7"/>
+              </a:cxn>
+              <a:cxn ang="0">
+                <a:pos x="connsiteX8" y="connsiteY8"/>
+              </a:cxn>
+              <a:cxn ang="0">
+                <a:pos x="connsiteX9" y="connsiteY9"/>
+              </a:cxn>
+            </a:cxnLst>
+            <a:rect l="l" t="t" r="r" b="b"/>
+            <a:pathLst>
+              <a:path w="7837716" h="6858000">
+                <a:moveTo>
+                  <a:pt x="2232159" y="0"/>
+                </a:moveTo>
+                <a:lnTo>
+                  <a:pt x="5605557" y="0"/>
+                </a:lnTo>
+                <a:lnTo>
+                  <a:pt x="5617845" y="5384"/>
+                </a:lnTo>
+                <a:cubicBezTo>
+                  <a:pt x="6931322" y="618789"/>
+                  <a:pt x="7837716" y="1921305"/>
+                  <a:pt x="7837716" y="3429000"/>
+                </a:cubicBezTo>
+                <a:cubicBezTo>
+                  <a:pt x="7837716" y="4936696"/>
+                  <a:pt x="6931322" y="6239212"/>
+                  <a:pt x="5617845" y="6852616"/>
+                </a:cubicBezTo>
+                <a:lnTo>
+                  <a:pt x="5605557" y="6858000"/>
+                </a:lnTo>
+                <a:lnTo>
+                  <a:pt x="2232159" y="6858000"/>
+                </a:lnTo>
+                <a:lnTo>
+                  <a:pt x="2219871" y="6852616"/>
+                </a:lnTo>
+                <a:cubicBezTo>
+                  <a:pt x="906394" y="6239212"/>
+                  <a:pt x="0" y="4936696"/>
+                  <a:pt x="0" y="3429000"/>
+                </a:cubicBezTo>
+                <a:cubicBezTo>
+                  <a:pt x="0" y="1921305"/>
+                  <a:pt x="906394" y="618789"/>
+                  <a:pt x="2219871" y="5384"/>
+                </a:cubicBezTo>
+                <a:close/>
+              </a:path>
+            </a:pathLst>
+          </a:custGeom>
+          <a:solidFill>
+            <a:schemeClr val="bg1"/>
+          </a:solidFill>
+          <a:ln>
+            <a:gradFill>
+              <a:gsLst>
+                <a:gs pos="0">
+                  <a:schemeClr val="accent1">
+                    <a:lumMod val="40000"/>
+                    <a:lumOff val="60000"/>
+                  </a:schemeClr>
+                </a:gs>
+                <a:gs pos="23000">
+                  <a:schemeClr val="accent1">
+                    <a:lumMod val="45000"/>
+                    <a:lumOff val="55000"/>
+                  </a:schemeClr>
+                </a:gs>
+                <a:gs pos="83000">
+                  <a:schemeClr val="bg2">
+                    <a:lumMod val="82000"/>
+                  </a:schemeClr>
+                </a:gs>
+                <a:gs pos="100000">
+                  <a:schemeClr val="bg2">
+                    <a:lumMod val="87000"/>
+                  </a:schemeClr>
+                </a:gs>
+              </a:gsLst>
+              <a:lin ang="5400000" scaled="1"/>
+            </a:gradFill>
+          </a:ln>
         </p:spPr>
         <p:style>
           <a:lnRef idx="2">
@@ -3839,22 +4035,52 @@
           </a:fontRef>
         </p:style>
         <p:txBody>
-          <a:bodyPr rtlCol="0" anchor="ctr"/>
+          <a:bodyPr wrap="square" rtlCol="0" anchor="ctr">
+            <a:noAutofit/>
+          </a:bodyPr>
           <a:lstStyle/>
           <a:p>
             <a:pPr algn="ctr"/>
-            <a:r>
-              <a:rPr lang="pt-BR"/>
-              <a:t>Slogan</a:t>
-            </a:r>
-            <a:endParaRPr lang="pt-BR" dirty="0"/>
-          </a:p>
-          <a:p>
-            <a:pPr algn="ctr"/>
-            <a:endParaRPr lang="pt-BR" dirty="0"/>
-          </a:p>
-        </p:txBody>
-      </p:sp>
+            <a:endParaRPr lang="en-US"/>
+          </a:p>
+        </p:txBody>
+      </p:sp>
+      <p:pic>
+        <p:nvPicPr>
+          <p:cNvPr id="19" name="Imagem 18" descr="Tela de celular com texto preto sobre fundo branco&#10;&#10;Descrição gerada automaticamente">
+            <a:extLst>
+              <a:ext uri="{FF2B5EF4-FFF2-40B4-BE49-F238E27FC236}">
+                <a16:creationId xmlns:a16="http://schemas.microsoft.com/office/drawing/2014/main" id="{341E351A-8D0F-4B23-A4C9-73DD2481DD32}"/>
+              </a:ext>
+            </a:extLst>
+          </p:cNvPr>
+          <p:cNvPicPr>
+            <a:picLocks noChangeAspect="1"/>
+          </p:cNvPicPr>
+          <p:nvPr/>
+        </p:nvPicPr>
+        <p:blipFill>
+          <a:blip r:embed="rId3">
+            <a:extLst>
+              <a:ext uri="{28A0092B-C50C-407E-A947-70E740481C1C}">
+                <a14:useLocalDpi xmlns:a14="http://schemas.microsoft.com/office/drawing/2010/main" val="0"/>
+              </a:ext>
+            </a:extLst>
+          </a:blip>
+          <a:stretch>
+            <a:fillRect/>
+          </a:stretch>
+        </p:blipFill>
+        <p:spPr>
+          <a:xfrm>
+            <a:off x="3693381" y="1176793"/>
+            <a:ext cx="4548146" cy="4548146"/>
+          </a:xfrm>
+          <a:prstGeom prst="rect">
+            <a:avLst/>
+          </a:prstGeom>
+        </p:spPr>
+      </p:pic>
     </p:spTree>
     <p:extLst>
       <p:ext uri="{BB962C8B-B14F-4D97-AF65-F5344CB8AC3E}">
@@ -3872,7 +4098,7 @@
 </file>
 
 <file path=ppt/slides/slide10.xml><?xml version="1.0" encoding="utf-8"?>
-<p:sld xmlns:a="http://schemas.openxmlformats.org/drawingml/2006/main" xmlns:r="http://schemas.openxmlformats.org/officeDocument/2006/relationships" xmlns:p="http://schemas.openxmlformats.org/presentationml/2006/main" show="0">
+<p:sld xmlns:a="http://schemas.openxmlformats.org/drawingml/2006/main" xmlns:r="http://schemas.openxmlformats.org/officeDocument/2006/relationships" xmlns:p="http://schemas.openxmlformats.org/presentationml/2006/main">
   <p:cSld>
     <p:spTree>
       <p:nvGrpSpPr>
@@ -3906,7 +4132,7 @@
         </p:nvSpPr>
         <p:spPr>
           <a:xfrm>
-            <a:off x="0" y="1433807"/>
+            <a:off x="-157019" y="0"/>
             <a:ext cx="12192000" cy="1325563"/>
           </a:xfrm>
         </p:spPr>
@@ -3925,17 +4151,75 @@
                 </a:solidFill>
                 <a:latin typeface="Bariol Bold" panose="02000506040000020003" pitchFamily="2" charset="0"/>
               </a:rPr>
-              <a:t>Site institucional / Simulador Financeiro</a:t>
+              <a:t>Análise de riscos do Projeto</a:t>
             </a:r>
           </a:p>
         </p:txBody>
       </p:sp>
       <p:pic>
         <p:nvPicPr>
-          <p:cNvPr id="5" name="Imagem 4" descr="Uma imagem contendo computador&#10;&#10;Descrição gerada automaticamente">
-            <a:extLst>
-              <a:ext uri="{FF2B5EF4-FFF2-40B4-BE49-F238E27FC236}">
-                <a16:creationId xmlns:a16="http://schemas.microsoft.com/office/drawing/2014/main" id="{83C4BF57-CA9B-4FB0-826A-3CF89B791B0E}"/>
+          <p:cNvPr id="3" name="Imagem 2">
+            <a:extLst>
+              <a:ext uri="{FF2B5EF4-FFF2-40B4-BE49-F238E27FC236}">
+                <a16:creationId xmlns:a16="http://schemas.microsoft.com/office/drawing/2014/main" id="{07C8B9B9-415B-4960-AFF9-3261FF8D6E7B}"/>
+              </a:ext>
+            </a:extLst>
+          </p:cNvPr>
+          <p:cNvPicPr>
+            <a:picLocks noChangeAspect="1"/>
+          </p:cNvPicPr>
+          <p:nvPr/>
+        </p:nvPicPr>
+        <p:blipFill rotWithShape="1">
+          <a:blip r:embed="rId2"/>
+          <a:srcRect l="265" r="357"/>
+          <a:stretch/>
+        </p:blipFill>
+        <p:spPr>
+          <a:xfrm>
+            <a:off x="230749" y="1541107"/>
+            <a:ext cx="7951226" cy="3451931"/>
+          </a:xfrm>
+          <a:prstGeom prst="rect">
+            <a:avLst/>
+          </a:prstGeom>
+        </p:spPr>
+      </p:pic>
+      <p:pic>
+        <p:nvPicPr>
+          <p:cNvPr id="7" name="Imagem 6">
+            <a:extLst>
+              <a:ext uri="{FF2B5EF4-FFF2-40B4-BE49-F238E27FC236}">
+                <a16:creationId xmlns:a16="http://schemas.microsoft.com/office/drawing/2014/main" id="{8487ACE9-3E43-4D45-B225-B88E20C61457}"/>
+              </a:ext>
+            </a:extLst>
+          </p:cNvPr>
+          <p:cNvPicPr>
+            <a:picLocks noChangeAspect="1"/>
+          </p:cNvPicPr>
+          <p:nvPr/>
+        </p:nvPicPr>
+        <p:blipFill rotWithShape="1">
+          <a:blip r:embed="rId3"/>
+          <a:srcRect t="873" b="349"/>
+          <a:stretch/>
+        </p:blipFill>
+        <p:spPr>
+          <a:xfrm>
+            <a:off x="8181975" y="2219325"/>
+            <a:ext cx="3889431" cy="2697513"/>
+          </a:xfrm>
+          <a:prstGeom prst="rect">
+            <a:avLst/>
+          </a:prstGeom>
+        </p:spPr>
+      </p:pic>
+      <p:pic>
+        <p:nvPicPr>
+          <p:cNvPr id="9" name="Imagem 8" descr="Tela de celular com texto preto sobre fundo branco&#10;&#10;Descrição gerada automaticamente">
+            <a:extLst>
+              <a:ext uri="{FF2B5EF4-FFF2-40B4-BE49-F238E27FC236}">
+                <a16:creationId xmlns:a16="http://schemas.microsoft.com/office/drawing/2014/main" id="{BA1F2B38-7DC9-4D1B-A632-58AA79797348}"/>
               </a:ext>
             </a:extLst>
           </p:cNvPr>
@@ -3945,7 +4229,7 @@
           <p:nvPr/>
         </p:nvPicPr>
         <p:blipFill>
-          <a:blip r:embed="rId2">
+          <a:blip r:embed="rId4">
             <a:extLst>
               <a:ext uri="{28A0092B-C50C-407E-A947-70E740481C1C}">
                 <a14:useLocalDpi xmlns:a14="http://schemas.microsoft.com/office/drawing/2010/main" val="0"/>
@@ -3958,63 +4242,14 @@
         </p:blipFill>
         <p:spPr>
           <a:xfrm>
-            <a:off x="2773007" y="2759370"/>
-            <a:ext cx="6645983" cy="3931007"/>
+            <a:off x="10363200" y="0"/>
+            <a:ext cx="1828800" cy="1828800"/>
           </a:xfrm>
           <a:prstGeom prst="rect">
             <a:avLst/>
           </a:prstGeom>
         </p:spPr>
       </p:pic>
-      <p:sp>
-        <p:nvSpPr>
-          <p:cNvPr id="4" name="Retângulo 3">
-            <a:extLst>
-              <a:ext uri="{FF2B5EF4-FFF2-40B4-BE49-F238E27FC236}">
-                <a16:creationId xmlns:a16="http://schemas.microsoft.com/office/drawing/2014/main" id="{75645B95-185D-4997-8245-D0133C191E72}"/>
-              </a:ext>
-            </a:extLst>
-          </p:cNvPr>
-          <p:cNvSpPr/>
-          <p:nvPr/>
-        </p:nvSpPr>
-        <p:spPr>
-          <a:xfrm>
-            <a:off x="11304105" y="418134"/>
-            <a:ext cx="432450" cy="535577"/>
-          </a:xfrm>
-          <a:prstGeom prst="rect">
-            <a:avLst/>
-          </a:prstGeom>
-        </p:spPr>
-        <p:style>
-          <a:lnRef idx="2">
-            <a:schemeClr val="accent1">
-              <a:shade val="50000"/>
-            </a:schemeClr>
-          </a:lnRef>
-          <a:fillRef idx="1">
-            <a:schemeClr val="accent1"/>
-          </a:fillRef>
-          <a:effectRef idx="0">
-            <a:schemeClr val="accent1"/>
-          </a:effectRef>
-          <a:fontRef idx="minor">
-            <a:schemeClr val="lt1"/>
-          </a:fontRef>
-        </p:style>
-        <p:txBody>
-          <a:bodyPr rtlCol="0" anchor="ctr"/>
-          <a:lstStyle/>
-          <a:p>
-            <a:pPr algn="ctr"/>
-            <a:r>
-              <a:rPr lang="pt-BR" dirty="0"/>
-              <a:t>Logo</a:t>
-            </a:r>
-          </a:p>
-        </p:txBody>
-      </p:sp>
     </p:spTree>
     <p:extLst>
       <p:ext uri="{BB962C8B-B14F-4D97-AF65-F5344CB8AC3E}">
@@ -4032,7 +4267,486 @@
 </file>
 
 <file path=ppt/slides/slide11.xml><?xml version="1.0" encoding="utf-8"?>
-<p:sld xmlns:a="http://schemas.openxmlformats.org/drawingml/2006/main" xmlns:r="http://schemas.openxmlformats.org/officeDocument/2006/relationships" xmlns:p="http://schemas.openxmlformats.org/presentationml/2006/main" show="0">
+<p:sld xmlns:a="http://schemas.openxmlformats.org/drawingml/2006/main" xmlns:r="http://schemas.openxmlformats.org/officeDocument/2006/relationships" xmlns:p="http://schemas.openxmlformats.org/presentationml/2006/main">
+  <p:cSld>
+    <p:spTree>
+      <p:nvGrpSpPr>
+        <p:cNvPr id="1" name=""/>
+        <p:cNvGrpSpPr/>
+        <p:nvPr/>
+      </p:nvGrpSpPr>
+      <p:grpSpPr>
+        <a:xfrm>
+          <a:off x="0" y="0"/>
+          <a:ext cx="0" cy="0"/>
+          <a:chOff x="0" y="0"/>
+          <a:chExt cx="0" cy="0"/>
+        </a:xfrm>
+      </p:grpSpPr>
+      <p:sp>
+        <p:nvSpPr>
+          <p:cNvPr id="2" name="Título 1">
+            <a:extLst>
+              <a:ext uri="{FF2B5EF4-FFF2-40B4-BE49-F238E27FC236}">
+                <a16:creationId xmlns:a16="http://schemas.microsoft.com/office/drawing/2014/main" id="{E6A43F2D-FDE4-444B-B931-21505B1D5A8C}"/>
+              </a:ext>
+            </a:extLst>
+          </p:cNvPr>
+          <p:cNvSpPr>
+            <a:spLocks noGrp="1"/>
+          </p:cNvSpPr>
+          <p:nvPr>
+            <p:ph type="title"/>
+          </p:nvPr>
+        </p:nvSpPr>
+        <p:spPr>
+          <a:xfrm>
+            <a:off x="2468913" y="304800"/>
+            <a:ext cx="9997698" cy="1052970"/>
+          </a:xfrm>
+        </p:spPr>
+        <p:txBody>
+          <a:bodyPr/>
+          <a:lstStyle/>
+          <a:p>
+            <a:r>
+              <a:rPr lang="pt-BR" dirty="0">
+                <a:latin typeface="Bariol Bold" panose="02000506040000020003"/>
+              </a:rPr>
+              <a:t>Backlog (Tabela de requisitos)</a:t>
+            </a:r>
+          </a:p>
+        </p:txBody>
+      </p:sp>
+      <p:pic>
+        <p:nvPicPr>
+          <p:cNvPr id="4" name="Imagem 3">
+            <a:extLst>
+              <a:ext uri="{FF2B5EF4-FFF2-40B4-BE49-F238E27FC236}">
+                <a16:creationId xmlns:a16="http://schemas.microsoft.com/office/drawing/2014/main" id="{35C9ABD0-F861-4774-B17A-04105EA53F44}"/>
+              </a:ext>
+            </a:extLst>
+          </p:cNvPr>
+          <p:cNvPicPr>
+            <a:picLocks noChangeAspect="1"/>
+          </p:cNvPicPr>
+          <p:nvPr/>
+        </p:nvPicPr>
+        <p:blipFill>
+          <a:blip r:embed="rId2"/>
+          <a:stretch>
+            <a:fillRect/>
+          </a:stretch>
+        </p:blipFill>
+        <p:spPr>
+          <a:xfrm>
+            <a:off x="1331213" y="1476374"/>
+            <a:ext cx="9529574" cy="4829176"/>
+          </a:xfrm>
+          <a:prstGeom prst="rect">
+            <a:avLst/>
+          </a:prstGeom>
+        </p:spPr>
+      </p:pic>
+      <p:pic>
+        <p:nvPicPr>
+          <p:cNvPr id="12" name="Imagem 11" descr="Tela de celular com texto preto sobre fundo branco&#10;&#10;Descrição gerada automaticamente">
+            <a:extLst>
+              <a:ext uri="{FF2B5EF4-FFF2-40B4-BE49-F238E27FC236}">
+                <a16:creationId xmlns:a16="http://schemas.microsoft.com/office/drawing/2014/main" id="{617098D2-79FA-4C51-B699-F69F9086F164}"/>
+              </a:ext>
+            </a:extLst>
+          </p:cNvPr>
+          <p:cNvPicPr>
+            <a:picLocks noChangeAspect="1"/>
+          </p:cNvPicPr>
+          <p:nvPr/>
+        </p:nvPicPr>
+        <p:blipFill>
+          <a:blip r:embed="rId3">
+            <a:extLst>
+              <a:ext uri="{28A0092B-C50C-407E-A947-70E740481C1C}">
+                <a14:useLocalDpi xmlns:a14="http://schemas.microsoft.com/office/drawing/2010/main" val="0"/>
+              </a:ext>
+            </a:extLst>
+          </a:blip>
+          <a:stretch>
+            <a:fillRect/>
+          </a:stretch>
+        </p:blipFill>
+        <p:spPr>
+          <a:xfrm>
+            <a:off x="10714182" y="0"/>
+            <a:ext cx="1477818" cy="1477818"/>
+          </a:xfrm>
+          <a:prstGeom prst="rect">
+            <a:avLst/>
+          </a:prstGeom>
+        </p:spPr>
+      </p:pic>
+    </p:spTree>
+    <p:extLst>
+      <p:ext uri="{BB962C8B-B14F-4D97-AF65-F5344CB8AC3E}">
+        <p14:creationId xmlns:p14="http://schemas.microsoft.com/office/powerpoint/2010/main" val="2272517251"/>
+      </p:ext>
+    </p:extLst>
+  </p:cSld>
+  <p:clrMapOvr>
+    <a:masterClrMapping/>
+  </p:clrMapOvr>
+  <p:transition>
+    <p:fade/>
+  </p:transition>
+</p:sld>
+</file>
+
+<file path=ppt/slides/slide12.xml><?xml version="1.0" encoding="utf-8"?>
+<p:sld xmlns:a="http://schemas.openxmlformats.org/drawingml/2006/main" xmlns:r="http://schemas.openxmlformats.org/officeDocument/2006/relationships" xmlns:p="http://schemas.openxmlformats.org/presentationml/2006/main">
+  <p:cSld>
+    <p:bg>
+      <p:bgPr>
+        <a:solidFill>
+          <a:schemeClr val="bg1"/>
+        </a:solidFill>
+        <a:effectLst/>
+      </p:bgPr>
+    </p:bg>
+    <p:spTree>
+      <p:nvGrpSpPr>
+        <p:cNvPr id="1" name=""/>
+        <p:cNvGrpSpPr/>
+        <p:nvPr/>
+      </p:nvGrpSpPr>
+      <p:grpSpPr>
+        <a:xfrm>
+          <a:off x="0" y="0"/>
+          <a:ext cx="0" cy="0"/>
+          <a:chOff x="0" y="0"/>
+          <a:chExt cx="0" cy="0"/>
+        </a:xfrm>
+      </p:grpSpPr>
+      <p:sp>
+        <p:nvSpPr>
+          <p:cNvPr id="12" name="Rectangle 11">
+            <a:extLst>
+              <a:ext uri="{FF2B5EF4-FFF2-40B4-BE49-F238E27FC236}">
+                <a16:creationId xmlns:a16="http://schemas.microsoft.com/office/drawing/2014/main" id="{823AC064-BC96-4F32-8AE1-B2FD38754823}"/>
+              </a:ext>
+              <a:ext uri="{C183D7F6-B498-43B3-948B-1728B52AA6E4}">
+                <adec:decorative xmlns:adec="http://schemas.microsoft.com/office/drawing/2017/decorative" val="1"/>
+              </a:ext>
+            </a:extLst>
+          </p:cNvPr>
+          <p:cNvSpPr>
+            <a:spLocks noGrp="1" noRot="1" noChangeAspect="1" noMove="1" noResize="1" noEditPoints="1" noAdjustHandles="1" noChangeArrowheads="1" noChangeShapeType="1" noTextEdit="1"/>
+          </p:cNvSpPr>
+          <p:nvPr>
+            <p:extLst>
+              <p:ext uri="{386F3935-93C4-4BCD-93E2-E3B085C9AB24}">
+                <p16:designElem xmlns:p16="http://schemas.microsoft.com/office/powerpoint/2015/main" val="1"/>
+              </p:ext>
+            </p:extLst>
+          </p:nvPr>
+        </p:nvSpPr>
+        <p:spPr bwMode="ltGray">
+          <a:xfrm>
+            <a:off x="396882" y="280374"/>
+            <a:ext cx="11438793" cy="1844256"/>
+          </a:xfrm>
+          <a:prstGeom prst="rect">
+            <a:avLst/>
+          </a:prstGeom>
+          <a:solidFill>
+            <a:srgbClr val="404040"/>
+          </a:solidFill>
+          <a:ln w="127000" cap="sq" cmpd="thinThick">
+            <a:solidFill>
+              <a:srgbClr val="404040"/>
+            </a:solidFill>
+          </a:ln>
+        </p:spPr>
+        <p:style>
+          <a:lnRef idx="2">
+            <a:schemeClr val="accent1">
+              <a:shade val="50000"/>
+            </a:schemeClr>
+          </a:lnRef>
+          <a:fillRef idx="1">
+            <a:schemeClr val="accent1"/>
+          </a:fillRef>
+          <a:effectRef idx="0">
+            <a:schemeClr val="accent1"/>
+          </a:effectRef>
+          <a:fontRef idx="minor">
+            <a:schemeClr val="lt1"/>
+          </a:fontRef>
+        </p:style>
+        <p:txBody>
+          <a:bodyPr rtlCol="0" anchor="ctr"/>
+          <a:lstStyle/>
+          <a:p>
+            <a:pPr algn="ctr"/>
+            <a:endParaRPr lang="en-US"/>
+          </a:p>
+        </p:txBody>
+      </p:sp>
+      <p:sp>
+        <p:nvSpPr>
+          <p:cNvPr id="7" name="Título 1">
+            <a:extLst>
+              <a:ext uri="{FF2B5EF4-FFF2-40B4-BE49-F238E27FC236}">
+                <a16:creationId xmlns:a16="http://schemas.microsoft.com/office/drawing/2014/main" id="{99F76FBE-1BC2-4EE6-B90A-22263BF7BDCD}"/>
+              </a:ext>
+            </a:extLst>
+          </p:cNvPr>
+          <p:cNvSpPr txBox="1">
+            <a:spLocks/>
+          </p:cNvSpPr>
+          <p:nvPr/>
+        </p:nvSpPr>
+        <p:spPr>
+          <a:xfrm>
+            <a:off x="546351" y="433545"/>
+            <a:ext cx="11139854" cy="930447"/>
+          </a:xfrm>
+          <a:prstGeom prst="rect">
+            <a:avLst/>
+          </a:prstGeom>
+        </p:spPr>
+        <p:txBody>
+          <a:bodyPr vert="horz" lIns="91440" tIns="45720" rIns="91440" bIns="45720" rtlCol="0" anchor="b">
+            <a:normAutofit/>
+          </a:bodyPr>
+          <a:lstStyle>
+            <a:lvl1pPr algn="l" defTabSz="914400" rtl="0" eaLnBrk="1" latinLnBrk="0" hangingPunct="1">
+              <a:lnSpc>
+                <a:spcPct val="90000"/>
+              </a:lnSpc>
+              <a:spcBef>
+                <a:spcPct val="0"/>
+              </a:spcBef>
+              <a:buNone/>
+              <a:defRPr sz="4400" kern="1200">
+                <a:solidFill>
+                  <a:schemeClr val="tx1"/>
+                </a:solidFill>
+                <a:latin typeface="+mj-lt"/>
+                <a:ea typeface="+mj-ea"/>
+                <a:cs typeface="+mj-cs"/>
+              </a:defRPr>
+            </a:lvl1pPr>
+          </a:lstStyle>
+          <a:p>
+            <a:pPr algn="ctr">
+              <a:spcAft>
+                <a:spcPts val="600"/>
+              </a:spcAft>
+            </a:pPr>
+            <a:r>
+              <a:rPr lang="en-US" sz="5400">
+                <a:solidFill>
+                  <a:srgbClr val="FFFFFF"/>
+                </a:solidFill>
+              </a:rPr>
+              <a:t>Site Institucional </a:t>
+            </a:r>
+          </a:p>
+        </p:txBody>
+      </p:sp>
+      <p:cxnSp>
+        <p:nvCxnSpPr>
+          <p:cNvPr id="14" name="Straight Connector 13">
+            <a:extLst>
+              <a:ext uri="{FF2B5EF4-FFF2-40B4-BE49-F238E27FC236}">
+                <a16:creationId xmlns:a16="http://schemas.microsoft.com/office/drawing/2014/main" id="{7E7C77BC-7138-40B1-A15B-20F57A494629}"/>
+              </a:ext>
+              <a:ext uri="{C183D7F6-B498-43B3-948B-1728B52AA6E4}">
+                <adec:decorative xmlns:adec="http://schemas.microsoft.com/office/drawing/2017/decorative" val="1"/>
+              </a:ext>
+            </a:extLst>
+          </p:cNvPr>
+          <p:cNvCxnSpPr>
+            <a:cxnSpLocks noGrp="1" noRot="1" noChangeAspect="1" noMove="1" noResize="1" noEditPoints="1" noAdjustHandles="1" noChangeArrowheads="1" noChangeShapeType="1"/>
+          </p:cNvCxnSpPr>
+          <p:nvPr>
+            <p:extLst>
+              <p:ext uri="{386F3935-93C4-4BCD-93E2-E3B085C9AB24}">
+                <p16:designElem xmlns:p16="http://schemas.microsoft.com/office/powerpoint/2015/main" val="1"/>
+              </p:ext>
+            </p:extLst>
+          </p:nvPr>
+        </p:nvCxnSpPr>
+        <p:spPr>
+          <a:xfrm>
+            <a:off x="2230078" y="1522292"/>
+            <a:ext cx="7772400" cy="0"/>
+          </a:xfrm>
+          <a:prstGeom prst="line">
+            <a:avLst/>
+          </a:prstGeom>
+          <a:ln w="22225">
+            <a:solidFill>
+              <a:srgbClr val="D9D9D9"/>
+            </a:solidFill>
+          </a:ln>
+        </p:spPr>
+        <p:style>
+          <a:lnRef idx="1">
+            <a:schemeClr val="accent1"/>
+          </a:lnRef>
+          <a:fillRef idx="0">
+            <a:schemeClr val="accent1"/>
+          </a:fillRef>
+          <a:effectRef idx="0">
+            <a:schemeClr val="accent1"/>
+          </a:effectRef>
+          <a:fontRef idx="minor">
+            <a:schemeClr val="tx1"/>
+          </a:fontRef>
+        </p:style>
+      </p:cxnSp>
+      <p:pic>
+        <p:nvPicPr>
+          <p:cNvPr id="3" name="Imagem 2" descr="Tela de celular com texto preto sobre fundo branco&#10;&#10;Descrição gerada automaticamente">
+            <a:extLst>
+              <a:ext uri="{FF2B5EF4-FFF2-40B4-BE49-F238E27FC236}">
+                <a16:creationId xmlns:a16="http://schemas.microsoft.com/office/drawing/2014/main" id="{D2E37DBF-A54E-49D3-B63D-C7FED0E29956}"/>
+              </a:ext>
+            </a:extLst>
+          </p:cNvPr>
+          <p:cNvPicPr>
+            <a:picLocks noChangeAspect="1"/>
+          </p:cNvPicPr>
+          <p:nvPr/>
+        </p:nvPicPr>
+        <p:blipFill>
+          <a:blip r:embed="rId2">
+            <a:extLst>
+              <a:ext uri="{28A0092B-C50C-407E-A947-70E740481C1C}">
+                <a14:useLocalDpi xmlns:a14="http://schemas.microsoft.com/office/drawing/2010/main" val="0"/>
+              </a:ext>
+            </a:extLst>
+          </a:blip>
+          <a:stretch>
+            <a:fillRect/>
+          </a:stretch>
+        </p:blipFill>
+        <p:spPr>
+          <a:xfrm>
+            <a:off x="984507" y="2512543"/>
+            <a:ext cx="3997637" cy="3997637"/>
+          </a:xfrm>
+          <a:prstGeom prst="rect">
+            <a:avLst/>
+          </a:prstGeom>
+        </p:spPr>
+      </p:pic>
+      <p:cxnSp>
+        <p:nvCxnSpPr>
+          <p:cNvPr id="16" name="Straight Connector 15">
+            <a:extLst>
+              <a:ext uri="{FF2B5EF4-FFF2-40B4-BE49-F238E27FC236}">
+                <a16:creationId xmlns:a16="http://schemas.microsoft.com/office/drawing/2014/main" id="{DB146403-F3D6-484B-B2ED-97F9565D0370}"/>
+              </a:ext>
+              <a:ext uri="{C183D7F6-B498-43B3-948B-1728B52AA6E4}">
+                <adec:decorative xmlns:adec="http://schemas.microsoft.com/office/drawing/2017/decorative" val="1"/>
+              </a:ext>
+            </a:extLst>
+          </p:cNvPr>
+          <p:cNvCxnSpPr>
+            <a:cxnSpLocks noGrp="1" noRot="1" noChangeAspect="1" noMove="1" noResize="1" noEditPoints="1" noAdjustHandles="1" noChangeArrowheads="1" noChangeShapeType="1"/>
+          </p:cNvCxnSpPr>
+          <p:nvPr>
+            <p:extLst>
+              <p:ext uri="{386F3935-93C4-4BCD-93E2-E3B085C9AB24}">
+                <p16:designElem xmlns:p16="http://schemas.microsoft.com/office/powerpoint/2015/main" val="1"/>
+              </p:ext>
+            </p:extLst>
+          </p:nvPr>
+        </p:nvCxnSpPr>
+        <p:spPr>
+          <a:xfrm>
+            <a:off x="6116278" y="2596836"/>
+            <a:ext cx="0" cy="3657600"/>
+          </a:xfrm>
+          <a:prstGeom prst="line">
+            <a:avLst/>
+          </a:prstGeom>
+          <a:ln w="101600" cmpd="dbl">
+            <a:solidFill>
+              <a:srgbClr val="595959"/>
+            </a:solidFill>
+          </a:ln>
+        </p:spPr>
+        <p:style>
+          <a:lnRef idx="1">
+            <a:schemeClr val="accent1"/>
+          </a:lnRef>
+          <a:fillRef idx="0">
+            <a:schemeClr val="accent1"/>
+          </a:fillRef>
+          <a:effectRef idx="0">
+            <a:schemeClr val="accent1"/>
+          </a:effectRef>
+          <a:fontRef idx="minor">
+            <a:schemeClr val="tx1"/>
+          </a:fontRef>
+        </p:style>
+      </p:cxnSp>
+      <p:pic>
+        <p:nvPicPr>
+          <p:cNvPr id="6" name="Imagem 5" descr="Uma imagem contendo computador&#10;&#10;Descrição gerada automaticamente">
+            <a:extLst>
+              <a:ext uri="{FF2B5EF4-FFF2-40B4-BE49-F238E27FC236}">
+                <a16:creationId xmlns:a16="http://schemas.microsoft.com/office/drawing/2014/main" id="{710AF17B-CB29-49D9-A312-DC9EB90E7151}"/>
+              </a:ext>
+            </a:extLst>
+          </p:cNvPr>
+          <p:cNvPicPr>
+            <a:picLocks noChangeAspect="1"/>
+          </p:cNvPicPr>
+          <p:nvPr/>
+        </p:nvPicPr>
+        <p:blipFill>
+          <a:blip r:embed="rId3">
+            <a:extLst>
+              <a:ext uri="{28A0092B-C50C-407E-A947-70E740481C1C}">
+                <a14:useLocalDpi xmlns:a14="http://schemas.microsoft.com/office/drawing/2010/main" val="0"/>
+              </a:ext>
+            </a:extLst>
+          </a:blip>
+          <a:stretch>
+            <a:fillRect/>
+          </a:stretch>
+        </p:blipFill>
+        <p:spPr>
+          <a:xfrm>
+            <a:off x="6445073" y="2891160"/>
+            <a:ext cx="5455917" cy="3068952"/>
+          </a:xfrm>
+          <a:prstGeom prst="rect">
+            <a:avLst/>
+          </a:prstGeom>
+        </p:spPr>
+      </p:pic>
+    </p:spTree>
+    <p:extLst>
+      <p:ext uri="{BB962C8B-B14F-4D97-AF65-F5344CB8AC3E}">
+        <p14:creationId xmlns:p14="http://schemas.microsoft.com/office/powerpoint/2010/main" val="65567604"/>
+      </p:ext>
+    </p:extLst>
+  </p:cSld>
+  <p:clrMapOvr>
+    <a:masterClrMapping/>
+  </p:clrMapOvr>
+  <p:transition>
+    <p:fade/>
+  </p:transition>
+</p:sld>
+</file>
+
+<file path=ppt/slides/slide13.xml><?xml version="1.0" encoding="utf-8"?>
+<p:sld xmlns:a="http://schemas.openxmlformats.org/drawingml/2006/main" xmlns:r="http://schemas.openxmlformats.org/officeDocument/2006/relationships" xmlns:p="http://schemas.openxmlformats.org/presentationml/2006/main">
   <p:cSld>
     <p:spTree>
       <p:nvGrpSpPr>
@@ -4196,6 +4910,42 @@
           </a:p>
         </p:txBody>
       </p:sp>
+      <p:pic>
+        <p:nvPicPr>
+          <p:cNvPr id="3" name="Imagem 2" descr="Tela de celular com texto preto sobre fundo branco&#10;&#10;Descrição gerada automaticamente">
+            <a:extLst>
+              <a:ext uri="{FF2B5EF4-FFF2-40B4-BE49-F238E27FC236}">
+                <a16:creationId xmlns:a16="http://schemas.microsoft.com/office/drawing/2014/main" id="{B13885CC-24AF-4D2B-A9D0-CEDCACD4E7E0}"/>
+              </a:ext>
+            </a:extLst>
+          </p:cNvPr>
+          <p:cNvPicPr>
+            <a:picLocks noChangeAspect="1"/>
+          </p:cNvPicPr>
+          <p:nvPr/>
+        </p:nvPicPr>
+        <p:blipFill>
+          <a:blip r:embed="rId3">
+            <a:extLst>
+              <a:ext uri="{28A0092B-C50C-407E-A947-70E740481C1C}">
+                <a14:useLocalDpi xmlns:a14="http://schemas.microsoft.com/office/drawing/2010/main" val="0"/>
+              </a:ext>
+            </a:extLst>
+          </a:blip>
+          <a:stretch>
+            <a:fillRect/>
+          </a:stretch>
+        </p:blipFill>
+        <p:spPr>
+          <a:xfrm>
+            <a:off x="10363200" y="0"/>
+            <a:ext cx="1828800" cy="1828800"/>
+          </a:xfrm>
+          <a:prstGeom prst="rect">
+            <a:avLst/>
+          </a:prstGeom>
+        </p:spPr>
+      </p:pic>
     </p:spTree>
     <p:extLst>
       <p:ext uri="{BB962C8B-B14F-4D97-AF65-F5344CB8AC3E}">
@@ -4212,8 +4962,8 @@
 </p:sld>
 </file>
 
-<file path=ppt/slides/slide12.xml><?xml version="1.0" encoding="utf-8"?>
-<p:sld xmlns:a="http://schemas.openxmlformats.org/drawingml/2006/main" xmlns:r="http://schemas.openxmlformats.org/officeDocument/2006/relationships" xmlns:p="http://schemas.openxmlformats.org/presentationml/2006/main" show="0">
+<file path=ppt/slides/slide14.xml><?xml version="1.0" encoding="utf-8"?>
+<p:sld xmlns:a="http://schemas.openxmlformats.org/drawingml/2006/main" xmlns:r="http://schemas.openxmlformats.org/officeDocument/2006/relationships" xmlns:p="http://schemas.openxmlformats.org/presentationml/2006/main">
   <p:cSld>
     <p:spTree>
       <p:nvGrpSpPr>
@@ -4287,7 +5037,7 @@
                 </a:solidFill>
                 <a:latin typeface="Bariol Bold" panose="02000506040000020003" pitchFamily="2" charset="0"/>
               </a:rPr>
-              <a:t>Arduíno e Sensor</a:t>
+              <a:t>Sensor Virtual</a:t>
             </a:r>
           </a:p>
         </p:txBody>
@@ -4377,45 +5127,12 @@
           </a:p>
         </p:txBody>
       </p:sp>
-    </p:spTree>
-    <p:extLst>
-      <p:ext uri="{BB962C8B-B14F-4D97-AF65-F5344CB8AC3E}">
-        <p14:creationId xmlns:p14="http://schemas.microsoft.com/office/powerpoint/2010/main" val="3564643130"/>
-      </p:ext>
-    </p:extLst>
-  </p:cSld>
-  <p:clrMapOvr>
-    <a:masterClrMapping/>
-  </p:clrMapOvr>
-  <p:transition>
-    <p:fade/>
-  </p:transition>
-</p:sld>
-</file>
-
-<file path=ppt/slides/slide13.xml><?xml version="1.0" encoding="utf-8"?>
-<p:sld xmlns:a="http://schemas.openxmlformats.org/drawingml/2006/main" xmlns:r="http://schemas.openxmlformats.org/officeDocument/2006/relationships" xmlns:p="http://schemas.openxmlformats.org/presentationml/2006/main" show="0">
-  <p:cSld>
-    <p:spTree>
-      <p:nvGrpSpPr>
-        <p:cNvPr id="1" name=""/>
-        <p:cNvGrpSpPr/>
-        <p:nvPr/>
-      </p:nvGrpSpPr>
-      <p:grpSpPr>
-        <a:xfrm>
-          <a:off x="0" y="0"/>
-          <a:ext cx="0" cy="0"/>
-          <a:chOff x="0" y="0"/>
-          <a:chExt cx="0" cy="0"/>
-        </a:xfrm>
-      </p:grpSpPr>
       <p:pic>
         <p:nvPicPr>
-          <p:cNvPr id="6" name="Imagem 5" descr="Uma imagem contendo computador&#10;&#10;Descrição gerada automaticamente">
-            <a:extLst>
-              <a:ext uri="{FF2B5EF4-FFF2-40B4-BE49-F238E27FC236}">
-                <a16:creationId xmlns:a16="http://schemas.microsoft.com/office/drawing/2014/main" id="{710AF17B-CB29-49D9-A312-DC9EB90E7151}"/>
+          <p:cNvPr id="3" name="Imagem 2" descr="Tela de celular com texto preto sobre fundo branco&#10;&#10;Descrição gerada automaticamente">
+            <a:extLst>
+              <a:ext uri="{FF2B5EF4-FFF2-40B4-BE49-F238E27FC236}">
+                <a16:creationId xmlns:a16="http://schemas.microsoft.com/office/drawing/2014/main" id="{6C3D3999-734B-4390-B183-50E5E71B61B2}"/>
               </a:ext>
             </a:extLst>
           </p:cNvPr>
@@ -4425,7 +5142,7 @@
           <p:nvPr/>
         </p:nvPicPr>
         <p:blipFill>
-          <a:blip r:embed="rId2">
+          <a:blip r:embed="rId3">
             <a:extLst>
               <a:ext uri="{28A0092B-C50C-407E-A947-70E740481C1C}">
                 <a14:useLocalDpi xmlns:a14="http://schemas.microsoft.com/office/drawing/2010/main" val="0"/>
@@ -4438,130 +5155,18 @@
         </p:blipFill>
         <p:spPr>
           <a:xfrm>
-            <a:off x="2663047" y="2537301"/>
-            <a:ext cx="6865904" cy="3854629"/>
+            <a:off x="10363200" y="0"/>
+            <a:ext cx="1828800" cy="1828800"/>
           </a:xfrm>
           <a:prstGeom prst="rect">
             <a:avLst/>
           </a:prstGeom>
         </p:spPr>
       </p:pic>
-      <p:sp>
-        <p:nvSpPr>
-          <p:cNvPr id="7" name="Título 1">
-            <a:extLst>
-              <a:ext uri="{FF2B5EF4-FFF2-40B4-BE49-F238E27FC236}">
-                <a16:creationId xmlns:a16="http://schemas.microsoft.com/office/drawing/2014/main" id="{99F76FBE-1BC2-4EE6-B90A-22263BF7BDCD}"/>
-              </a:ext>
-            </a:extLst>
-          </p:cNvPr>
-          <p:cNvSpPr txBox="1">
-            <a:spLocks/>
-          </p:cNvSpPr>
-          <p:nvPr/>
-        </p:nvSpPr>
-        <p:spPr>
-          <a:xfrm>
-            <a:off x="838199" y="1433807"/>
-            <a:ext cx="10515600" cy="1325563"/>
-          </a:xfrm>
-          <a:prstGeom prst="rect">
-            <a:avLst/>
-          </a:prstGeom>
-        </p:spPr>
-        <p:txBody>
-          <a:bodyPr vert="horz" lIns="91440" tIns="45720" rIns="91440" bIns="45720" rtlCol="0" anchor="ctr">
-            <a:normAutofit/>
-          </a:bodyPr>
-          <a:lstStyle>
-            <a:lvl1pPr algn="l" defTabSz="914400" rtl="0" eaLnBrk="1" latinLnBrk="0" hangingPunct="1">
-              <a:lnSpc>
-                <a:spcPct val="90000"/>
-              </a:lnSpc>
-              <a:spcBef>
-                <a:spcPct val="0"/>
-              </a:spcBef>
-              <a:buNone/>
-              <a:defRPr sz="4400" kern="1200">
-                <a:solidFill>
-                  <a:schemeClr val="tx1"/>
-                </a:solidFill>
-                <a:latin typeface="+mj-lt"/>
-                <a:ea typeface="+mj-ea"/>
-                <a:cs typeface="+mj-cs"/>
-              </a:defRPr>
-            </a:lvl1pPr>
-          </a:lstStyle>
-          <a:p>
-            <a:pPr algn="ctr"/>
-            <a:r>
-              <a:rPr lang="pt-BR" dirty="0">
-                <a:solidFill>
-                  <a:schemeClr val="tx1">
-                    <a:lumMod val="75000"/>
-                    <a:lumOff val="25000"/>
-                  </a:schemeClr>
-                </a:solidFill>
-                <a:latin typeface="Bariol Bold" panose="02000506040000020003" pitchFamily="2" charset="0"/>
-              </a:rPr>
-              <a:t>Repositório no GitHub</a:t>
-            </a:r>
-          </a:p>
-        </p:txBody>
-      </p:sp>
-      <p:sp>
-        <p:nvSpPr>
-          <p:cNvPr id="2" name="Retângulo 1">
-            <a:extLst>
-              <a:ext uri="{FF2B5EF4-FFF2-40B4-BE49-F238E27FC236}">
-                <a16:creationId xmlns:a16="http://schemas.microsoft.com/office/drawing/2014/main" id="{76153932-2191-4993-96E3-4D6873E6EF3E}"/>
-              </a:ext>
-            </a:extLst>
-          </p:cNvPr>
-          <p:cNvSpPr/>
-          <p:nvPr/>
-        </p:nvSpPr>
-        <p:spPr>
-          <a:xfrm>
-            <a:off x="11053876" y="510899"/>
-            <a:ext cx="599846" cy="628788"/>
-          </a:xfrm>
-          <a:prstGeom prst="rect">
-            <a:avLst/>
-          </a:prstGeom>
-        </p:spPr>
-        <p:style>
-          <a:lnRef idx="2">
-            <a:schemeClr val="accent1">
-              <a:shade val="50000"/>
-            </a:schemeClr>
-          </a:lnRef>
-          <a:fillRef idx="1">
-            <a:schemeClr val="accent1"/>
-          </a:fillRef>
-          <a:effectRef idx="0">
-            <a:schemeClr val="accent1"/>
-          </a:effectRef>
-          <a:fontRef idx="minor">
-            <a:schemeClr val="lt1"/>
-          </a:fontRef>
-        </p:style>
-        <p:txBody>
-          <a:bodyPr rtlCol="0" anchor="ctr"/>
-          <a:lstStyle/>
-          <a:p>
-            <a:pPr algn="ctr"/>
-            <a:r>
-              <a:rPr lang="pt-BR" dirty="0"/>
-              <a:t>Logo</a:t>
-            </a:r>
-          </a:p>
-        </p:txBody>
-      </p:sp>
     </p:spTree>
     <p:extLst>
       <p:ext uri="{BB962C8B-B14F-4D97-AF65-F5344CB8AC3E}">
-        <p14:creationId xmlns:p14="http://schemas.microsoft.com/office/powerpoint/2010/main" val="65567604"/>
+        <p14:creationId xmlns:p14="http://schemas.microsoft.com/office/powerpoint/2010/main" val="3564643130"/>
       </p:ext>
     </p:extLst>
   </p:cSld>
@@ -4650,15 +5255,15 @@
         </p:spPr>
         <p:style>
           <a:lnRef idx="2">
-            <a:schemeClr val="accent1">
+            <a:schemeClr val="accent3">
               <a:shade val="50000"/>
             </a:schemeClr>
           </a:lnRef>
           <a:fillRef idx="1">
-            <a:schemeClr val="accent1"/>
+            <a:schemeClr val="accent3"/>
           </a:fillRef>
           <a:effectRef idx="0">
-            <a:schemeClr val="accent1"/>
+            <a:schemeClr val="accent3"/>
           </a:effectRef>
           <a:fontRef idx="minor">
             <a:schemeClr val="lt1"/>
@@ -4696,15 +5301,15 @@
         </p:spPr>
         <p:style>
           <a:lnRef idx="2">
-            <a:schemeClr val="accent1">
+            <a:schemeClr val="accent3">
               <a:shade val="50000"/>
             </a:schemeClr>
           </a:lnRef>
           <a:fillRef idx="1">
-            <a:schemeClr val="accent1"/>
+            <a:schemeClr val="accent3"/>
           </a:fillRef>
           <a:effectRef idx="0">
-            <a:schemeClr val="accent1"/>
+            <a:schemeClr val="accent3"/>
           </a:effectRef>
           <a:fontRef idx="minor">
             <a:schemeClr val="lt1"/>
@@ -4742,15 +5347,15 @@
         </p:spPr>
         <p:style>
           <a:lnRef idx="2">
-            <a:schemeClr val="accent1">
+            <a:schemeClr val="accent3">
               <a:shade val="50000"/>
             </a:schemeClr>
           </a:lnRef>
           <a:fillRef idx="1">
-            <a:schemeClr val="accent1"/>
+            <a:schemeClr val="accent3"/>
           </a:fillRef>
           <a:effectRef idx="0">
-            <a:schemeClr val="accent1"/>
+            <a:schemeClr val="accent3"/>
           </a:effectRef>
           <a:fontRef idx="minor">
             <a:schemeClr val="lt1"/>
@@ -4788,15 +5393,15 @@
         </p:spPr>
         <p:style>
           <a:lnRef idx="2">
-            <a:schemeClr val="accent1">
+            <a:schemeClr val="accent3">
               <a:shade val="50000"/>
             </a:schemeClr>
           </a:lnRef>
           <a:fillRef idx="1">
-            <a:schemeClr val="accent1"/>
+            <a:schemeClr val="accent3"/>
           </a:fillRef>
           <a:effectRef idx="0">
-            <a:schemeClr val="accent1"/>
+            <a:schemeClr val="accent3"/>
           </a:effectRef>
           <a:fontRef idx="minor">
             <a:schemeClr val="lt1"/>
@@ -4834,15 +5439,15 @@
         </p:spPr>
         <p:style>
           <a:lnRef idx="2">
-            <a:schemeClr val="accent1">
+            <a:schemeClr val="accent3">
               <a:shade val="50000"/>
             </a:schemeClr>
           </a:lnRef>
           <a:fillRef idx="1">
-            <a:schemeClr val="accent1"/>
+            <a:schemeClr val="accent3"/>
           </a:fillRef>
           <a:effectRef idx="0">
-            <a:schemeClr val="accent1"/>
+            <a:schemeClr val="accent3"/>
           </a:effectRef>
           <a:fontRef idx="minor">
             <a:schemeClr val="lt1"/>
@@ -5059,55 +5664,42 @@
           </a:p>
         </p:txBody>
       </p:sp>
-      <p:sp>
-        <p:nvSpPr>
-          <p:cNvPr id="13" name="Retângulo 12">
-            <a:extLst>
-              <a:ext uri="{FF2B5EF4-FFF2-40B4-BE49-F238E27FC236}">
-                <a16:creationId xmlns:a16="http://schemas.microsoft.com/office/drawing/2014/main" id="{E415A40E-2165-41CB-8585-07C2295FCCEB}"/>
-              </a:ext>
-            </a:extLst>
-          </p:cNvPr>
-          <p:cNvSpPr/>
+      <p:pic>
+        <p:nvPicPr>
+          <p:cNvPr id="19" name="Imagem 18" descr="Tela de celular com texto preto sobre fundo branco&#10;&#10;Descrição gerada automaticamente">
+            <a:extLst>
+              <a:ext uri="{FF2B5EF4-FFF2-40B4-BE49-F238E27FC236}">
+                <a16:creationId xmlns:a16="http://schemas.microsoft.com/office/drawing/2014/main" id="{81268163-4E5F-4416-9493-3EFBB2BCA3AC}"/>
+              </a:ext>
+            </a:extLst>
+          </p:cNvPr>
+          <p:cNvPicPr>
+            <a:picLocks noChangeAspect="1"/>
+          </p:cNvPicPr>
           <p:nvPr/>
-        </p:nvSpPr>
-        <p:spPr>
-          <a:xfrm>
-            <a:off x="11190935" y="442532"/>
-            <a:ext cx="626165" cy="549275"/>
+        </p:nvPicPr>
+        <p:blipFill>
+          <a:blip r:embed="rId2">
+            <a:extLst>
+              <a:ext uri="{28A0092B-C50C-407E-A947-70E740481C1C}">
+                <a14:useLocalDpi xmlns:a14="http://schemas.microsoft.com/office/drawing/2010/main" val="0"/>
+              </a:ext>
+            </a:extLst>
+          </a:blip>
+          <a:stretch>
+            <a:fillRect/>
+          </a:stretch>
+        </p:blipFill>
+        <p:spPr>
+          <a:xfrm>
+            <a:off x="10363200" y="0"/>
+            <a:ext cx="1828800" cy="1828800"/>
           </a:xfrm>
           <a:prstGeom prst="rect">
             <a:avLst/>
           </a:prstGeom>
         </p:spPr>
-        <p:style>
-          <a:lnRef idx="2">
-            <a:schemeClr val="accent1">
-              <a:shade val="50000"/>
-            </a:schemeClr>
-          </a:lnRef>
-          <a:fillRef idx="1">
-            <a:schemeClr val="accent1"/>
-          </a:fillRef>
-          <a:effectRef idx="0">
-            <a:schemeClr val="accent1"/>
-          </a:effectRef>
-          <a:fontRef idx="minor">
-            <a:schemeClr val="lt1"/>
-          </a:fontRef>
-        </p:style>
-        <p:txBody>
-          <a:bodyPr rtlCol="0" anchor="ctr"/>
-          <a:lstStyle/>
-          <a:p>
-            <a:pPr algn="ctr"/>
-            <a:r>
-              <a:rPr lang="pt-BR" dirty="0"/>
-              <a:t>Logo</a:t>
-            </a:r>
-          </a:p>
-        </p:txBody>
-      </p:sp>
+      </p:pic>
     </p:spTree>
     <p:extLst>
       <p:ext uri="{BB962C8B-B14F-4D97-AF65-F5344CB8AC3E}">
@@ -5163,7 +5755,7 @@
           <a:lstStyle/>
           <a:p>
             <a:r>
-              <a:rPr lang="pt-BR" dirty="0">
+              <a:rPr lang="pt-BR">
                 <a:solidFill>
                   <a:schemeClr val="tx1">
                     <a:lumMod val="75000"/>
@@ -5174,6 +5766,15 @@
               </a:rPr>
               <a:t>Segmento/Mercado</a:t>
             </a:r>
+            <a:endParaRPr lang="pt-BR" dirty="0">
+              <a:solidFill>
+                <a:schemeClr val="tx1">
+                  <a:lumMod val="75000"/>
+                  <a:lumOff val="25000"/>
+                </a:schemeClr>
+              </a:solidFill>
+              <a:latin typeface="Bariol Bold" panose="02000506040000020003" pitchFamily="2" charset="0"/>
+            </a:endParaRPr>
           </a:p>
         </p:txBody>
       </p:sp>
@@ -5214,7 +5815,7 @@
               <a:buChar char="Ø"/>
             </a:pPr>
             <a:r>
-              <a:rPr lang="pt-BR" dirty="0">
+              <a:rPr lang="pt-BR">
                 <a:latin typeface="Bariol Bold" panose="02000506040000020003" pitchFamily="2" charset="0"/>
               </a:rPr>
               <a:t>Nosso alvo principal é a indústria, que domina a economia de diversos países, sendo crucial no Brasil. </a:t>
@@ -5229,7 +5830,7 @@
               <a:buFont typeface="Wingdings" panose="05000000000000000000" pitchFamily="2" charset="2"/>
               <a:buChar char="Ø"/>
             </a:pPr>
-            <a:endParaRPr lang="pt-BR" dirty="0">
+            <a:endParaRPr lang="pt-BR">
               <a:latin typeface="Bariol Bold" panose="02000506040000020003" pitchFamily="2" charset="0"/>
             </a:endParaRPr>
           </a:p>
@@ -5243,7 +5844,7 @@
               <a:buChar char="Ø"/>
             </a:pPr>
             <a:r>
-              <a:rPr lang="pt-BR" dirty="0">
+              <a:rPr lang="pt-BR">
                 <a:solidFill>
                   <a:schemeClr val="tx1">
                     <a:lumMod val="85000"/>
@@ -5254,6 +5855,15 @@
               </a:rPr>
               <a:t>A indústria é o maior meio de produção de riquezas, representa 21,2% do PIB do Brasil, além de empregar 9,4 milhões de trabalhadores, 20% de empregos formais.</a:t>
             </a:r>
+            <a:endParaRPr lang="pt-BR" dirty="0">
+              <a:solidFill>
+                <a:schemeClr val="tx1">
+                  <a:lumMod val="85000"/>
+                  <a:lumOff val="15000"/>
+                </a:schemeClr>
+              </a:solidFill>
+              <a:latin typeface="Bariol Bold" panose="02000506040000020003" pitchFamily="2" charset="0"/>
+            </a:endParaRPr>
           </a:p>
         </p:txBody>
       </p:sp>
@@ -5287,55 +5897,42 @@
           </a:prstGeom>
         </p:spPr>
       </p:pic>
-      <p:sp>
-        <p:nvSpPr>
-          <p:cNvPr id="4" name="Retângulo 3">
-            <a:extLst>
-              <a:ext uri="{FF2B5EF4-FFF2-40B4-BE49-F238E27FC236}">
-                <a16:creationId xmlns:a16="http://schemas.microsoft.com/office/drawing/2014/main" id="{98F5DCB9-A1B3-4F97-9625-A476C3623C48}"/>
-              </a:ext>
-            </a:extLst>
-          </p:cNvPr>
-          <p:cNvSpPr/>
+      <p:pic>
+        <p:nvPicPr>
+          <p:cNvPr id="11" name="Imagem 10" descr="Tela de celular com texto preto sobre fundo branco&#10;&#10;Descrição gerada automaticamente">
+            <a:extLst>
+              <a:ext uri="{FF2B5EF4-FFF2-40B4-BE49-F238E27FC236}">
+                <a16:creationId xmlns:a16="http://schemas.microsoft.com/office/drawing/2014/main" id="{64CD594B-DB4A-4E7E-AA8B-5AE911E15259}"/>
+              </a:ext>
+            </a:extLst>
+          </p:cNvPr>
+          <p:cNvPicPr>
+            <a:picLocks noChangeAspect="1"/>
+          </p:cNvPicPr>
           <p:nvPr/>
-        </p:nvSpPr>
-        <p:spPr>
-          <a:xfrm>
-            <a:off x="11353800" y="365125"/>
-            <a:ext cx="599661" cy="628788"/>
+        </p:nvPicPr>
+        <p:blipFill>
+          <a:blip r:embed="rId3">
+            <a:extLst>
+              <a:ext uri="{28A0092B-C50C-407E-A947-70E740481C1C}">
+                <a14:useLocalDpi xmlns:a14="http://schemas.microsoft.com/office/drawing/2010/main" val="0"/>
+              </a:ext>
+            </a:extLst>
+          </a:blip>
+          <a:stretch>
+            <a:fillRect/>
+          </a:stretch>
+        </p:blipFill>
+        <p:spPr>
+          <a:xfrm>
+            <a:off x="10363200" y="0"/>
+            <a:ext cx="1828800" cy="1828800"/>
           </a:xfrm>
           <a:prstGeom prst="rect">
             <a:avLst/>
           </a:prstGeom>
         </p:spPr>
-        <p:style>
-          <a:lnRef idx="2">
-            <a:schemeClr val="accent1">
-              <a:shade val="50000"/>
-            </a:schemeClr>
-          </a:lnRef>
-          <a:fillRef idx="1">
-            <a:schemeClr val="accent1"/>
-          </a:fillRef>
-          <a:effectRef idx="0">
-            <a:schemeClr val="accent1"/>
-          </a:effectRef>
-          <a:fontRef idx="minor">
-            <a:schemeClr val="lt1"/>
-          </a:fontRef>
-        </p:style>
-        <p:txBody>
-          <a:bodyPr rtlCol="0" anchor="ctr"/>
-          <a:lstStyle/>
-          <a:p>
-            <a:pPr algn="ctr"/>
-            <a:r>
-              <a:rPr lang="pt-BR" dirty="0"/>
-              <a:t>logo</a:t>
-            </a:r>
-          </a:p>
-        </p:txBody>
-      </p:sp>
+      </p:pic>
     </p:spTree>
     <p:extLst>
       <p:ext uri="{BB962C8B-B14F-4D97-AF65-F5344CB8AC3E}">
@@ -5532,7 +6129,7 @@
           <a:lstStyle/>
           <a:p>
             <a:r>
-              <a:rPr lang="pt-BR" dirty="0">
+              <a:rPr lang="pt-BR">
                 <a:solidFill>
                   <a:schemeClr val="tx1">
                     <a:lumMod val="75000"/>
@@ -5543,6 +6140,15 @@
               </a:rPr>
               <a:t>Contexto</a:t>
             </a:r>
+            <a:endParaRPr lang="pt-BR" dirty="0">
+              <a:solidFill>
+                <a:schemeClr val="tx1">
+                  <a:lumMod val="75000"/>
+                  <a:lumOff val="25000"/>
+                </a:schemeClr>
+              </a:solidFill>
+              <a:latin typeface="Bariol Bold" panose="02000506040000020003" pitchFamily="2" charset="0"/>
+            </a:endParaRPr>
           </a:p>
         </p:txBody>
       </p:sp>
@@ -5616,7 +6222,7 @@
               </a:buClr>
               <a:buSzPct val="80000"/>
             </a:pPr>
-            <a:endParaRPr lang="pt-BR" sz="2400" dirty="0">
+            <a:endParaRPr lang="pt-BR" sz="2400">
               <a:solidFill>
                 <a:schemeClr val="tx1">
                   <a:lumMod val="85000"/>
@@ -5636,7 +6242,7 @@
               <a:buChar char="Ø"/>
             </a:pPr>
             <a:r>
-              <a:rPr lang="pt-BR" sz="2000" dirty="0">
+              <a:rPr lang="pt-BR" sz="2000">
                 <a:solidFill>
                   <a:schemeClr val="tx1">
                     <a:lumMod val="85000"/>
@@ -5657,7 +6263,7 @@
               <a:buFont typeface="Wingdings" panose="05000000000000000000" pitchFamily="2" charset="2"/>
               <a:buChar char="Ø"/>
             </a:pPr>
-            <a:endParaRPr lang="pt-BR" sz="2000" dirty="0">
+            <a:endParaRPr lang="pt-BR" sz="2000">
               <a:solidFill>
                 <a:schemeClr val="tx1">
                   <a:lumMod val="85000"/>
@@ -5677,7 +6283,7 @@
               <a:buChar char="Ø"/>
             </a:pPr>
             <a:r>
-              <a:rPr lang="pt-BR" sz="2000" dirty="0">
+              <a:rPr lang="pt-BR" sz="2000">
                 <a:latin typeface="Bariol Bold" panose="02000506040000020003"/>
               </a:rPr>
               <a:t> A indústria 4.0 busca não somente aprimorar os processos de produção.</a:t>
@@ -5737,12 +6343,49 @@
           <a:p>
             <a:pPr algn="ctr"/>
             <a:r>
-              <a:rPr lang="pt-BR" dirty="0"/>
+              <a:rPr lang="pt-BR"/>
               <a:t>logo</a:t>
             </a:r>
-          </a:p>
-        </p:txBody>
-      </p:sp>
+            <a:endParaRPr lang="pt-BR" dirty="0"/>
+          </a:p>
+        </p:txBody>
+      </p:sp>
+      <p:pic>
+        <p:nvPicPr>
+          <p:cNvPr id="3" name="Imagem 2" descr="Tela de celular com texto preto sobre fundo branco&#10;&#10;Descrição gerada automaticamente">
+            <a:extLst>
+              <a:ext uri="{FF2B5EF4-FFF2-40B4-BE49-F238E27FC236}">
+                <a16:creationId xmlns:a16="http://schemas.microsoft.com/office/drawing/2014/main" id="{AE91A6EE-48C1-46C2-8AE3-F9F3BBF4B45A}"/>
+              </a:ext>
+            </a:extLst>
+          </p:cNvPr>
+          <p:cNvPicPr>
+            <a:picLocks noChangeAspect="1"/>
+          </p:cNvPicPr>
+          <p:nvPr/>
+        </p:nvPicPr>
+        <p:blipFill>
+          <a:blip r:embed="rId3">
+            <a:extLst>
+              <a:ext uri="{28A0092B-C50C-407E-A947-70E740481C1C}">
+                <a14:useLocalDpi xmlns:a14="http://schemas.microsoft.com/office/drawing/2010/main" val="0"/>
+              </a:ext>
+            </a:extLst>
+          </a:blip>
+          <a:stretch>
+            <a:fillRect/>
+          </a:stretch>
+        </p:blipFill>
+        <p:spPr>
+          <a:xfrm>
+            <a:off x="10363200" y="0"/>
+            <a:ext cx="1828800" cy="1828800"/>
+          </a:xfrm>
+          <a:prstGeom prst="rect">
+            <a:avLst/>
+          </a:prstGeom>
+        </p:spPr>
+      </p:pic>
     </p:spTree>
     <p:extLst>
       <p:ext uri="{BB962C8B-B14F-4D97-AF65-F5344CB8AC3E}">
@@ -5949,7 +6592,7 @@
         <p:spPr>
           <a:xfrm>
             <a:off x="838200" y="2274838"/>
-            <a:ext cx="5995851" cy="3170099"/>
+            <a:ext cx="5995851" cy="2246769"/>
           </a:xfrm>
           <a:prstGeom prst="rect">
             <a:avLst/>
@@ -6003,17 +6646,8 @@
               <a:rPr lang="pt-BR" sz="2000" dirty="0">
                 <a:latin typeface="Bariol Bold" panose="02000506040000020003" pitchFamily="2" charset="0"/>
               </a:rPr>
-              <a:t>A ABDEE constatou que entre 2014 e 2016 foram desperdiçados equivalentes R$ 61,7 bilhões com </a:t>
-            </a:r>
-            <a:r>
-              <a:rPr lang="pt-BR" sz="2000">
-                <a:latin typeface="Bariol Bold" panose="02000506040000020003" pitchFamily="2" charset="0"/>
-              </a:rPr>
-              <a:t>energia elétrica. </a:t>
-            </a:r>
-            <a:endParaRPr lang="pt-BR" sz="2000" dirty="0">
-              <a:latin typeface="Bariol Bold" panose="02000506040000020003" pitchFamily="2" charset="0"/>
-            </a:endParaRPr>
+              <a:t>Segundo ABDEE, 2014 e 2016 foram desperdiçados R$ 61,7 bilhões. </a:t>
+            </a:r>
           </a:p>
           <a:p>
             <a:pPr marL="285750" indent="-285750">
@@ -6041,60 +6675,47 @@
               <a:rPr lang="pt-BR" sz="2000" dirty="0">
                 <a:latin typeface="Bariol Bold" panose="02000506040000020003" pitchFamily="2" charset="0"/>
               </a:rPr>
-              <a:t>O meio ambiente sofre com emissões de gases, como o CO2 e também com o grande desmatamento de áreas para criar hidrelétricas. </a:t>
-            </a:r>
-          </a:p>
-        </p:txBody>
-      </p:sp>
-      <p:sp>
-        <p:nvSpPr>
-          <p:cNvPr id="5" name="Retângulo 4">
-            <a:extLst>
-              <a:ext uri="{FF2B5EF4-FFF2-40B4-BE49-F238E27FC236}">
-                <a16:creationId xmlns:a16="http://schemas.microsoft.com/office/drawing/2014/main" id="{D1CC238A-EBA8-4DE8-BB27-93D09D2CC6BB}"/>
-              </a:ext>
-            </a:extLst>
-          </p:cNvPr>
-          <p:cNvSpPr/>
+              <a:t>Emissão de gases CO2</a:t>
+            </a:r>
+          </a:p>
+        </p:txBody>
+      </p:sp>
+      <p:pic>
+        <p:nvPicPr>
+          <p:cNvPr id="3" name="Imagem 2" descr="Tela de celular com texto preto sobre fundo branco&#10;&#10;Descrição gerada automaticamente">
+            <a:extLst>
+              <a:ext uri="{FF2B5EF4-FFF2-40B4-BE49-F238E27FC236}">
+                <a16:creationId xmlns:a16="http://schemas.microsoft.com/office/drawing/2014/main" id="{40022FA2-F9D7-4A32-9BC9-1A6A35356513}"/>
+              </a:ext>
+            </a:extLst>
+          </p:cNvPr>
+          <p:cNvPicPr>
+            <a:picLocks noChangeAspect="1"/>
+          </p:cNvPicPr>
           <p:nvPr/>
-        </p:nvSpPr>
-        <p:spPr>
-          <a:xfrm>
-            <a:off x="11211436" y="375186"/>
-            <a:ext cx="495203" cy="535577"/>
+        </p:nvPicPr>
+        <p:blipFill>
+          <a:blip r:embed="rId3">
+            <a:extLst>
+              <a:ext uri="{28A0092B-C50C-407E-A947-70E740481C1C}">
+                <a14:useLocalDpi xmlns:a14="http://schemas.microsoft.com/office/drawing/2010/main" val="0"/>
+              </a:ext>
+            </a:extLst>
+          </a:blip>
+          <a:stretch>
+            <a:fillRect/>
+          </a:stretch>
+        </p:blipFill>
+        <p:spPr>
+          <a:xfrm>
+            <a:off x="10363200" y="0"/>
+            <a:ext cx="1828800" cy="1828800"/>
           </a:xfrm>
           <a:prstGeom prst="rect">
             <a:avLst/>
           </a:prstGeom>
         </p:spPr>
-        <p:style>
-          <a:lnRef idx="2">
-            <a:schemeClr val="accent1">
-              <a:shade val="50000"/>
-            </a:schemeClr>
-          </a:lnRef>
-          <a:fillRef idx="1">
-            <a:schemeClr val="accent1"/>
-          </a:fillRef>
-          <a:effectRef idx="0">
-            <a:schemeClr val="accent1"/>
-          </a:effectRef>
-          <a:fontRef idx="minor">
-            <a:schemeClr val="lt1"/>
-          </a:fontRef>
-        </p:style>
-        <p:txBody>
-          <a:bodyPr rtlCol="0" anchor="ctr"/>
-          <a:lstStyle/>
-          <a:p>
-            <a:pPr algn="ctr"/>
-            <a:r>
-              <a:rPr lang="pt-BR" dirty="0"/>
-              <a:t>logo</a:t>
-            </a:r>
-          </a:p>
-        </p:txBody>
-      </p:sp>
+      </p:pic>
     </p:spTree>
     <p:extLst>
       <p:ext uri="{BB962C8B-B14F-4D97-AF65-F5344CB8AC3E}">
@@ -6433,7 +7054,7 @@
         <p:spPr>
           <a:xfrm>
             <a:off x="838200" y="2274838"/>
-            <a:ext cx="5995851" cy="2862322"/>
+            <a:ext cx="5995851" cy="1938992"/>
           </a:xfrm>
           <a:prstGeom prst="rect">
             <a:avLst/>
@@ -6485,7 +7106,7 @@
               <a:rPr lang="pt-BR" sz="2000" dirty="0">
                 <a:latin typeface="Bariol Bold" panose="02000506040000020003" pitchFamily="2" charset="0"/>
               </a:rPr>
-              <a:t>Sensores de luminosidade, diminuem a potência da lâmpada de acordo com a incidência de luz natural.</a:t>
+              <a:t>Gastos desnecessários com energia elétrica </a:t>
             </a:r>
           </a:p>
           <a:p>
@@ -6512,60 +7133,47 @@
               <a:rPr lang="pt-BR" sz="2000" dirty="0">
                 <a:latin typeface="Bariol Bold" panose="02000506040000020003" pitchFamily="2" charset="0"/>
               </a:rPr>
-              <a:t>Coletamos os dados e fornecemos ao cliente por meio do nosso site, para que ele tenha controle de seus gastos e economia com energia.</a:t>
-            </a:r>
-          </a:p>
-        </p:txBody>
-      </p:sp>
-      <p:sp>
-        <p:nvSpPr>
-          <p:cNvPr id="4" name="Retângulo 3">
-            <a:extLst>
-              <a:ext uri="{FF2B5EF4-FFF2-40B4-BE49-F238E27FC236}">
-                <a16:creationId xmlns:a16="http://schemas.microsoft.com/office/drawing/2014/main" id="{C2EC7991-9531-4578-BF02-D6268FA24F17}"/>
-              </a:ext>
-            </a:extLst>
-          </p:cNvPr>
-          <p:cNvSpPr/>
+              <a:t>Sensor de luminosidade LDR 5mm </a:t>
+            </a:r>
+          </a:p>
+        </p:txBody>
+      </p:sp>
+      <p:pic>
+        <p:nvPicPr>
+          <p:cNvPr id="3" name="Imagem 2" descr="Tela de celular com texto preto sobre fundo branco&#10;&#10;Descrição gerada automaticamente">
+            <a:extLst>
+              <a:ext uri="{FF2B5EF4-FFF2-40B4-BE49-F238E27FC236}">
+                <a16:creationId xmlns:a16="http://schemas.microsoft.com/office/drawing/2014/main" id="{7CAA8CC1-1A42-4594-8576-0981C9C1FAC7}"/>
+              </a:ext>
+            </a:extLst>
+          </p:cNvPr>
+          <p:cNvPicPr>
+            <a:picLocks noChangeAspect="1"/>
+          </p:cNvPicPr>
           <p:nvPr/>
-        </p:nvSpPr>
-        <p:spPr>
-          <a:xfrm>
-            <a:off x="11266784" y="462410"/>
-            <a:ext cx="626165" cy="536023"/>
+        </p:nvPicPr>
+        <p:blipFill>
+          <a:blip r:embed="rId3">
+            <a:extLst>
+              <a:ext uri="{28A0092B-C50C-407E-A947-70E740481C1C}">
+                <a14:useLocalDpi xmlns:a14="http://schemas.microsoft.com/office/drawing/2010/main" val="0"/>
+              </a:ext>
+            </a:extLst>
+          </a:blip>
+          <a:stretch>
+            <a:fillRect/>
+          </a:stretch>
+        </p:blipFill>
+        <p:spPr>
+          <a:xfrm>
+            <a:off x="10363200" y="0"/>
+            <a:ext cx="1828800" cy="1828800"/>
           </a:xfrm>
           <a:prstGeom prst="rect">
             <a:avLst/>
           </a:prstGeom>
         </p:spPr>
-        <p:style>
-          <a:lnRef idx="2">
-            <a:schemeClr val="accent1">
-              <a:shade val="50000"/>
-            </a:schemeClr>
-          </a:lnRef>
-          <a:fillRef idx="1">
-            <a:schemeClr val="accent1"/>
-          </a:fillRef>
-          <a:effectRef idx="0">
-            <a:schemeClr val="accent1"/>
-          </a:effectRef>
-          <a:fontRef idx="minor">
-            <a:schemeClr val="lt1"/>
-          </a:fontRef>
-        </p:style>
-        <p:txBody>
-          <a:bodyPr rtlCol="0" anchor="ctr"/>
-          <a:lstStyle/>
-          <a:p>
-            <a:pPr algn="ctr"/>
-            <a:r>
-              <a:rPr lang="pt-BR" dirty="0"/>
-              <a:t>logo</a:t>
-            </a:r>
-          </a:p>
-        </p:txBody>
-      </p:sp>
+      </p:pic>
     </p:spTree>
     <p:extLst>
       <p:ext uri="{BB962C8B-B14F-4D97-AF65-F5344CB8AC3E}">
@@ -6898,55 +7506,6 @@
           </a:prstGeom>
         </p:spPr>
       </p:pic>
-      <p:sp>
-        <p:nvSpPr>
-          <p:cNvPr id="2" name="Retângulo 1">
-            <a:extLst>
-              <a:ext uri="{FF2B5EF4-FFF2-40B4-BE49-F238E27FC236}">
-                <a16:creationId xmlns:a16="http://schemas.microsoft.com/office/drawing/2014/main" id="{1AE890D4-7EA1-41DE-A6BA-7895D7998696}"/>
-              </a:ext>
-            </a:extLst>
-          </p:cNvPr>
-          <p:cNvSpPr/>
-          <p:nvPr/>
-        </p:nvSpPr>
-        <p:spPr>
-          <a:xfrm>
-            <a:off x="11279662" y="351873"/>
-            <a:ext cx="502208" cy="535577"/>
-          </a:xfrm>
-          <a:prstGeom prst="rect">
-            <a:avLst/>
-          </a:prstGeom>
-        </p:spPr>
-        <p:style>
-          <a:lnRef idx="2">
-            <a:schemeClr val="accent1">
-              <a:shade val="50000"/>
-            </a:schemeClr>
-          </a:lnRef>
-          <a:fillRef idx="1">
-            <a:schemeClr val="accent1"/>
-          </a:fillRef>
-          <a:effectRef idx="0">
-            <a:schemeClr val="accent1"/>
-          </a:effectRef>
-          <a:fontRef idx="minor">
-            <a:schemeClr val="lt1"/>
-          </a:fontRef>
-        </p:style>
-        <p:txBody>
-          <a:bodyPr rtlCol="0" anchor="ctr"/>
-          <a:lstStyle/>
-          <a:p>
-            <a:pPr algn="ctr"/>
-            <a:r>
-              <a:rPr lang="pt-BR" dirty="0"/>
-              <a:t>Logo</a:t>
-            </a:r>
-          </a:p>
-        </p:txBody>
-      </p:sp>
       <p:pic>
         <p:nvPicPr>
           <p:cNvPr id="29" name="Imagem 28" descr="Uma imagem contendo relógio, desenho, placar&#10;&#10;Descrição gerada automaticamente">
@@ -7712,6 +8271,41 @@
                 </a:outerShdw>
               </a:effectLst>
             </a:endParaRPr>
+          </a:p>
+        </p:txBody>
+      </p:sp>
+      <p:sp>
+        <p:nvSpPr>
+          <p:cNvPr id="3" name="CaixaDeTexto 2">
+            <a:extLst>
+              <a:ext uri="{FF2B5EF4-FFF2-40B4-BE49-F238E27FC236}">
+                <a16:creationId xmlns:a16="http://schemas.microsoft.com/office/drawing/2014/main" id="{F3FA0D65-7BD7-4371-9BC2-84DBDF7AF9C3}"/>
+              </a:ext>
+            </a:extLst>
+          </p:cNvPr>
+          <p:cNvSpPr txBox="1"/>
+          <p:nvPr/>
+        </p:nvSpPr>
+        <p:spPr>
+          <a:xfrm>
+            <a:off x="0" y="-83099"/>
+            <a:ext cx="978408" cy="369332"/>
+          </a:xfrm>
+          <a:prstGeom prst="rect">
+            <a:avLst/>
+          </a:prstGeom>
+          <a:noFill/>
+        </p:spPr>
+        <p:txBody>
+          <a:bodyPr wrap="square" rtlCol="0">
+            <a:spAutoFit/>
+          </a:bodyPr>
+          <a:lstStyle/>
+          <a:p>
+            <a:r>
+              <a:rPr lang="pt-BR" dirty="0"/>
+              <a:t>HLD</a:t>
+            </a:r>
           </a:p>
         </p:txBody>
       </p:sp>
@@ -7750,124 +8344,6 @@
       </p:grpSpPr>
       <p:sp>
         <p:nvSpPr>
-          <p:cNvPr id="5" name="Retângulo 4">
-            <a:extLst>
-              <a:ext uri="{FF2B5EF4-FFF2-40B4-BE49-F238E27FC236}">
-                <a16:creationId xmlns:a16="http://schemas.microsoft.com/office/drawing/2014/main" id="{C7DA5607-1511-4ED4-AF25-AE99974C9C15}"/>
-              </a:ext>
-            </a:extLst>
-          </p:cNvPr>
-          <p:cNvSpPr/>
-          <p:nvPr/>
-        </p:nvSpPr>
-        <p:spPr>
-          <a:xfrm>
-            <a:off x="11476382" y="238539"/>
-            <a:ext cx="569843" cy="596347"/>
-          </a:xfrm>
-          <a:prstGeom prst="rect">
-            <a:avLst/>
-          </a:prstGeom>
-        </p:spPr>
-        <p:style>
-          <a:lnRef idx="2">
-            <a:schemeClr val="accent1">
-              <a:shade val="50000"/>
-            </a:schemeClr>
-          </a:lnRef>
-          <a:fillRef idx="1">
-            <a:schemeClr val="accent1"/>
-          </a:fillRef>
-          <a:effectRef idx="0">
-            <a:schemeClr val="accent1"/>
-          </a:effectRef>
-          <a:fontRef idx="minor">
-            <a:schemeClr val="lt1"/>
-          </a:fontRef>
-        </p:style>
-        <p:txBody>
-          <a:bodyPr rtlCol="0" anchor="ctr"/>
-          <a:lstStyle/>
-          <a:p>
-            <a:pPr algn="ctr"/>
-            <a:r>
-              <a:rPr lang="pt-BR" dirty="0"/>
-              <a:t>Logo</a:t>
-            </a:r>
-          </a:p>
-        </p:txBody>
-      </p:sp>
-      <p:pic>
-        <p:nvPicPr>
-          <p:cNvPr id="3" name="Imagem 2" descr="Uma imagem contendo texto, screenshot&#10;&#10;Descrição gerada automaticamente">
-            <a:extLst>
-              <a:ext uri="{FF2B5EF4-FFF2-40B4-BE49-F238E27FC236}">
-                <a16:creationId xmlns:a16="http://schemas.microsoft.com/office/drawing/2014/main" id="{6C938E71-B49B-4DEF-875F-557045C5151F}"/>
-              </a:ext>
-            </a:extLst>
-          </p:cNvPr>
-          <p:cNvPicPr>
-            <a:picLocks noChangeAspect="1"/>
-          </p:cNvPicPr>
-          <p:nvPr/>
-        </p:nvPicPr>
-        <p:blipFill>
-          <a:blip r:embed="rId2">
-            <a:extLst>
-              <a:ext uri="{28A0092B-C50C-407E-A947-70E740481C1C}">
-                <a14:useLocalDpi xmlns:a14="http://schemas.microsoft.com/office/drawing/2010/main" val="0"/>
-              </a:ext>
-            </a:extLst>
-          </a:blip>
-          <a:stretch>
-            <a:fillRect/>
-          </a:stretch>
-        </p:blipFill>
-        <p:spPr>
-          <a:xfrm>
-            <a:off x="13254" y="13252"/>
-            <a:ext cx="11463128" cy="6844748"/>
-          </a:xfrm>
-          <a:prstGeom prst="rect">
-            <a:avLst/>
-          </a:prstGeom>
-        </p:spPr>
-      </p:pic>
-    </p:spTree>
-    <p:extLst>
-      <p:ext uri="{BB962C8B-B14F-4D97-AF65-F5344CB8AC3E}">
-        <p14:creationId xmlns:p14="http://schemas.microsoft.com/office/powerpoint/2010/main" val="2075578980"/>
-      </p:ext>
-    </p:extLst>
-  </p:cSld>
-  <p:clrMapOvr>
-    <a:masterClrMapping/>
-  </p:clrMapOvr>
-  <p:transition>
-    <p:fade/>
-  </p:transition>
-</p:sld>
-</file>
-
-<file path=ppt/slides/slide9.xml><?xml version="1.0" encoding="utf-8"?>
-<p:sld xmlns:a="http://schemas.openxmlformats.org/drawingml/2006/main" xmlns:r="http://schemas.openxmlformats.org/officeDocument/2006/relationships" xmlns:p="http://schemas.openxmlformats.org/presentationml/2006/main" show="0">
-  <p:cSld>
-    <p:spTree>
-      <p:nvGrpSpPr>
-        <p:cNvPr id="1" name=""/>
-        <p:cNvGrpSpPr/>
-        <p:nvPr/>
-      </p:nvGrpSpPr>
-      <p:grpSpPr>
-        <a:xfrm>
-          <a:off x="0" y="0"/>
-          <a:ext cx="0" cy="0"/>
-          <a:chOff x="0" y="0"/>
-          <a:chExt cx="0" cy="0"/>
-        </a:xfrm>
-      </p:grpSpPr>
-      <p:sp>
-        <p:nvSpPr>
           <p:cNvPr id="2" name="Título 1">
             <a:extLst>
               <a:ext uri="{FF2B5EF4-FFF2-40B4-BE49-F238E27FC236}">
@@ -7897,7 +8373,7 @@
                 </a:solidFill>
                 <a:latin typeface="Bariol Bold" panose="02000506040000020003" pitchFamily="2" charset="0"/>
               </a:rPr>
-              <a:t>Requisitos (Backlog)</a:t>
+              <a:t>Lumens e Watts</a:t>
             </a:r>
           </a:p>
         </p:txBody>
@@ -7940,10 +8416,10 @@
       </p:pic>
       <p:sp>
         <p:nvSpPr>
-          <p:cNvPr id="5" name="CaixaDeTexto 4">
-            <a:extLst>
-              <a:ext uri="{FF2B5EF4-FFF2-40B4-BE49-F238E27FC236}">
-                <a16:creationId xmlns:a16="http://schemas.microsoft.com/office/drawing/2014/main" id="{869545E3-DC46-4CDB-A839-CA8AA4E80E78}"/>
+          <p:cNvPr id="7" name="CaixaDeTexto 6">
+            <a:extLst>
+              <a:ext uri="{FF2B5EF4-FFF2-40B4-BE49-F238E27FC236}">
+                <a16:creationId xmlns:a16="http://schemas.microsoft.com/office/drawing/2014/main" id="{57DE2915-CA86-450D-BE38-084EC6B769DC}"/>
               </a:ext>
             </a:extLst>
           </p:cNvPr>
@@ -7953,7 +8429,7 @@
         <p:spPr>
           <a:xfrm>
             <a:off x="838200" y="2274838"/>
-            <a:ext cx="5995851" cy="1938992"/>
+            <a:ext cx="5995851" cy="3231654"/>
           </a:xfrm>
           <a:prstGeom prst="rect">
             <a:avLst/>
@@ -7966,130 +8442,124 @@
           </a:bodyPr>
           <a:lstStyle/>
           <a:p>
-            <a:pPr marL="342900" indent="-342900">
+            <a:pPr marL="285750" indent="-285750">
               <a:buClr>
                 <a:srgbClr val="4772FF"/>
               </a:buClr>
               <a:buSzPct val="80000"/>
               <a:buFont typeface="Wingdings" panose="05000000000000000000" pitchFamily="2" charset="2"/>
-              <a:buChar char="ü"/>
+              <a:buChar char="Ø"/>
             </a:pPr>
             <a:r>
-              <a:rPr lang="pt-BR" sz="2400" dirty="0">
-                <a:latin typeface="Bariol Bold" panose="02000506040000020003" pitchFamily="2" charset="0"/>
-              </a:rPr>
-              <a:t>Sensor de Luminosidade</a:t>
-            </a:r>
-          </a:p>
-          <a:p>
-            <a:pPr marL="342900" indent="-342900">
+              <a:rPr lang="pt-BR" dirty="0"/>
+              <a:t>O Lúmen é a quantidade de luz emitida por uma lâmpada em todas direções, também chamada de fluxo luminoso</a:t>
+            </a:r>
+          </a:p>
+          <a:p>
+            <a:pPr marL="285750" indent="-285750">
               <a:buClr>
                 <a:srgbClr val="4772FF"/>
               </a:buClr>
               <a:buSzPct val="80000"/>
               <a:buFont typeface="Wingdings" panose="05000000000000000000" pitchFamily="2" charset="2"/>
-              <a:buChar char="ü"/>
+              <a:buChar char="Ø"/>
             </a:pPr>
-            <a:endParaRPr lang="pt-BR" sz="2400" dirty="0">
+            <a:endParaRPr lang="pt-BR" sz="2000" dirty="0">
               <a:latin typeface="Bariol Bold" panose="02000506040000020003" pitchFamily="2" charset="0"/>
             </a:endParaRPr>
           </a:p>
           <a:p>
-            <a:pPr marL="342900" indent="-342900">
+            <a:pPr marL="285750" indent="-285750">
               <a:buClr>
                 <a:srgbClr val="4772FF"/>
               </a:buClr>
               <a:buSzPct val="80000"/>
               <a:buFont typeface="Wingdings" panose="05000000000000000000" pitchFamily="2" charset="2"/>
-              <a:buChar char="ü"/>
+              <a:buChar char="Ø"/>
             </a:pPr>
             <a:r>
-              <a:rPr lang="pt-BR" sz="2400" dirty="0">
-                <a:latin typeface="Bariol Bold" panose="02000506040000020003" pitchFamily="2" charset="0"/>
-              </a:rPr>
-              <a:t>Site Institucional</a:t>
-            </a:r>
-          </a:p>
-          <a:p>
-            <a:pPr marL="342900" indent="-342900">
+              <a:rPr lang="pt-BR" dirty="0"/>
+              <a:t>O Watt, mais pelo público em geral é também chamado de potência, simplesmente diz respeito ao consumo de energia</a:t>
+            </a:r>
+          </a:p>
+          <a:p>
+            <a:pPr marL="285750" indent="-285750">
               <a:buClr>
                 <a:srgbClr val="4772FF"/>
               </a:buClr>
               <a:buSzPct val="80000"/>
               <a:buFont typeface="Wingdings" panose="05000000000000000000" pitchFamily="2" charset="2"/>
-              <a:buChar char="ü"/>
+              <a:buChar char="Ø"/>
             </a:pPr>
-            <a:endParaRPr lang="pt-BR" sz="2400" dirty="0">
+            <a:endParaRPr lang="pt-BR" sz="2000" dirty="0">
               <a:latin typeface="Bariol Bold" panose="02000506040000020003" pitchFamily="2" charset="0"/>
             </a:endParaRPr>
           </a:p>
           <a:p>
-            <a:pPr marL="342900" indent="-342900">
+            <a:pPr marL="285750" indent="-285750">
               <a:buClr>
                 <a:srgbClr val="4772FF"/>
               </a:buClr>
               <a:buSzPct val="80000"/>
               <a:buFont typeface="Wingdings" panose="05000000000000000000" pitchFamily="2" charset="2"/>
-              <a:buChar char="ü"/>
+              <a:buChar char="Ø"/>
             </a:pPr>
             <a:r>
-              <a:rPr lang="pt-BR" sz="2400" dirty="0">
-                <a:latin typeface="Bariol Bold" panose="02000506040000020003" pitchFamily="2" charset="0"/>
-              </a:rPr>
-              <a:t>Dado 3 </a:t>
-            </a:r>
-          </a:p>
-        </p:txBody>
-      </p:sp>
-      <p:sp>
-        <p:nvSpPr>
-          <p:cNvPr id="4" name="Retângulo 3">
-            <a:extLst>
-              <a:ext uri="{FF2B5EF4-FFF2-40B4-BE49-F238E27FC236}">
-                <a16:creationId xmlns:a16="http://schemas.microsoft.com/office/drawing/2014/main" id="{CCA5311D-EF96-4507-99DB-02863CED5AB7}"/>
-              </a:ext>
-            </a:extLst>
-          </p:cNvPr>
-          <p:cNvSpPr/>
+              <a:rPr lang="pt-BR" dirty="0"/>
+              <a:t>Uma boa lâmpada irá iluminar bem consumindo pouca energia, ou seja, terá uma alta taxa de lúmens e um baixo valor de watts.</a:t>
+            </a:r>
+          </a:p>
+          <a:p>
+            <a:pPr marL="285750" indent="-285750">
+              <a:buClr>
+                <a:srgbClr val="4772FF"/>
+              </a:buClr>
+              <a:buSzPct val="80000"/>
+              <a:buFont typeface="Wingdings" panose="05000000000000000000" pitchFamily="2" charset="2"/>
+              <a:buChar char="Ø"/>
+            </a:pPr>
+            <a:endParaRPr lang="pt-BR" sz="2000" dirty="0">
+              <a:latin typeface="Bariol Bold" panose="02000506040000020003" pitchFamily="2" charset="0"/>
+            </a:endParaRPr>
+          </a:p>
+        </p:txBody>
+      </p:sp>
+      <p:pic>
+        <p:nvPicPr>
+          <p:cNvPr id="9" name="Imagem 8" descr="Tela de celular com texto preto sobre fundo branco&#10;&#10;Descrição gerada automaticamente">
+            <a:extLst>
+              <a:ext uri="{FF2B5EF4-FFF2-40B4-BE49-F238E27FC236}">
+                <a16:creationId xmlns:a16="http://schemas.microsoft.com/office/drawing/2014/main" id="{4E6C9014-3ECD-4788-AD32-A4E80CF73CA9}"/>
+              </a:ext>
+            </a:extLst>
+          </p:cNvPr>
+          <p:cNvPicPr>
+            <a:picLocks noChangeAspect="1"/>
+          </p:cNvPicPr>
           <p:nvPr/>
-        </p:nvSpPr>
-        <p:spPr>
-          <a:xfrm>
-            <a:off x="11304792" y="502389"/>
-            <a:ext cx="488956" cy="535577"/>
+        </p:nvPicPr>
+        <p:blipFill>
+          <a:blip r:embed="rId3">
+            <a:extLst>
+              <a:ext uri="{28A0092B-C50C-407E-A947-70E740481C1C}">
+                <a14:useLocalDpi xmlns:a14="http://schemas.microsoft.com/office/drawing/2010/main" val="0"/>
+              </a:ext>
+            </a:extLst>
+          </a:blip>
+          <a:stretch>
+            <a:fillRect/>
+          </a:stretch>
+        </p:blipFill>
+        <p:spPr>
+          <a:xfrm>
+            <a:off x="10363200" y="0"/>
+            <a:ext cx="1828800" cy="1828800"/>
           </a:xfrm>
           <a:prstGeom prst="rect">
             <a:avLst/>
           </a:prstGeom>
         </p:spPr>
-        <p:style>
-          <a:lnRef idx="2">
-            <a:schemeClr val="accent1">
-              <a:shade val="50000"/>
-            </a:schemeClr>
-          </a:lnRef>
-          <a:fillRef idx="1">
-            <a:schemeClr val="accent1"/>
-          </a:fillRef>
-          <a:effectRef idx="0">
-            <a:schemeClr val="accent1"/>
-          </a:effectRef>
-          <a:fontRef idx="minor">
-            <a:schemeClr val="lt1"/>
-          </a:fontRef>
-        </p:style>
-        <p:txBody>
-          <a:bodyPr rtlCol="0" anchor="ctr"/>
-          <a:lstStyle/>
-          <a:p>
-            <a:pPr algn="ctr"/>
-            <a:r>
-              <a:rPr lang="pt-BR" dirty="0"/>
-              <a:t>Logo</a:t>
-            </a:r>
-          </a:p>
-        </p:txBody>
-      </p:sp>
+      </p:pic>
     </p:spTree>
     <p:extLst>
       <p:ext uri="{BB962C8B-B14F-4D97-AF65-F5344CB8AC3E}">
@@ -8127,7 +8597,7 @@
                             </p:stCondLst>
                             <p:childTnLst>
                               <p:par>
-                                <p:cTn id="5" presetID="10" presetClass="entr" presetSubtype="0" fill="hold" grpId="0" nodeType="afterEffect">
+                                <p:cTn id="5" presetID="10" presetClass="entr" presetSubtype="0" fill="hold" nodeType="afterEffect">
                                   <p:stCondLst>
                                     <p:cond delay="0"/>
                                   </p:stCondLst>
@@ -8140,11 +8610,7 @@
                                           </p:stCondLst>
                                         </p:cTn>
                                         <p:tgtEl>
-                                          <p:spTgt spid="5">
-                                            <p:txEl>
-                                              <p:pRg st="0" end="0"/>
-                                            </p:txEl>
-                                          </p:spTgt>
+                                          <p:spTgt spid="6"/>
                                         </p:tgtEl>
                                         <p:attrNameLst>
                                           <p:attrName>style.visibility</p:attrName>
@@ -8158,11 +8624,7 @@
                                       <p:cBhvr>
                                         <p:cTn id="7" dur="500"/>
                                         <p:tgtEl>
-                                          <p:spTgt spid="5">
-                                            <p:txEl>
-                                              <p:pRg st="0" end="0"/>
-                                            </p:txEl>
-                                          </p:spTgt>
+                                          <p:spTgt spid="6"/>
                                         </p:tgtEl>
                                       </p:cBhvr>
                                     </p:animEffect>
@@ -8192,7 +8654,68 @@
                                           </p:stCondLst>
                                         </p:cTn>
                                         <p:tgtEl>
-                                          <p:spTgt spid="5">
+                                          <p:spTgt spid="7">
+                                            <p:txEl>
+                                              <p:pRg st="0" end="0"/>
+                                            </p:txEl>
+                                          </p:spTgt>
+                                        </p:tgtEl>
+                                        <p:attrNameLst>
+                                          <p:attrName>style.visibility</p:attrName>
+                                        </p:attrNameLst>
+                                      </p:cBhvr>
+                                      <p:to>
+                                        <p:strVal val="visible"/>
+                                      </p:to>
+                                    </p:set>
+                                    <p:animEffect transition="in" filter="fade">
+                                      <p:cBhvr>
+                                        <p:cTn id="11" dur="500"/>
+                                        <p:tgtEl>
+                                          <p:spTgt spid="7">
+                                            <p:txEl>
+                                              <p:pRg st="0" end="0"/>
+                                            </p:txEl>
+                                          </p:spTgt>
+                                        </p:tgtEl>
+                                      </p:cBhvr>
+                                    </p:animEffect>
+                                  </p:childTnLst>
+                                </p:cTn>
+                              </p:par>
+                            </p:childTnLst>
+                          </p:cTn>
+                        </p:par>
+                      </p:childTnLst>
+                    </p:cTn>
+                  </p:par>
+                  <p:par>
+                    <p:cTn id="12" fill="hold">
+                      <p:stCondLst>
+                        <p:cond delay="indefinite"/>
+                      </p:stCondLst>
+                      <p:childTnLst>
+                        <p:par>
+                          <p:cTn id="13" fill="hold">
+                            <p:stCondLst>
+                              <p:cond delay="0"/>
+                            </p:stCondLst>
+                            <p:childTnLst>
+                              <p:par>
+                                <p:cTn id="14" presetID="10" presetClass="entr" presetSubtype="0" fill="hold" grpId="0" nodeType="clickEffect">
+                                  <p:stCondLst>
+                                    <p:cond delay="0"/>
+                                  </p:stCondLst>
+                                  <p:childTnLst>
+                                    <p:set>
+                                      <p:cBhvr>
+                                        <p:cTn id="15" dur="1" fill="hold">
+                                          <p:stCondLst>
+                                            <p:cond delay="0"/>
+                                          </p:stCondLst>
+                                        </p:cTn>
+                                        <p:tgtEl>
+                                          <p:spTgt spid="7">
                                             <p:txEl>
                                               <p:pRg st="2" end="2"/>
                                             </p:txEl>
@@ -8208,9 +8731,9 @@
                                     </p:set>
                                     <p:animEffect transition="in" filter="fade">
                                       <p:cBhvr>
-                                        <p:cTn id="11" dur="500"/>
+                                        <p:cTn id="16" dur="500"/>
                                         <p:tgtEl>
-                                          <p:spTgt spid="5">
+                                          <p:spTgt spid="7">
                                             <p:txEl>
                                               <p:pRg st="2" end="2"/>
                                             </p:txEl>
@@ -8221,21 +8744,39 @@
                                   </p:childTnLst>
                                 </p:cTn>
                               </p:par>
+                            </p:childTnLst>
+                          </p:cTn>
+                        </p:par>
+                      </p:childTnLst>
+                    </p:cTn>
+                  </p:par>
+                  <p:par>
+                    <p:cTn id="17" fill="hold">
+                      <p:stCondLst>
+                        <p:cond delay="indefinite"/>
+                      </p:stCondLst>
+                      <p:childTnLst>
+                        <p:par>
+                          <p:cTn id="18" fill="hold">
+                            <p:stCondLst>
+                              <p:cond delay="0"/>
+                            </p:stCondLst>
+                            <p:childTnLst>
                               <p:par>
-                                <p:cTn id="12" presetID="10" presetClass="entr" presetSubtype="0" fill="hold" grpId="0" nodeType="withEffect">
+                                <p:cTn id="19" presetID="10" presetClass="entr" presetSubtype="0" fill="hold" grpId="0" nodeType="clickEffect">
                                   <p:stCondLst>
                                     <p:cond delay="0"/>
                                   </p:stCondLst>
                                   <p:childTnLst>
                                     <p:set>
                                       <p:cBhvr>
-                                        <p:cTn id="13" dur="1" fill="hold">
+                                        <p:cTn id="20" dur="1" fill="hold">
                                           <p:stCondLst>
                                             <p:cond delay="0"/>
                                           </p:stCondLst>
                                         </p:cTn>
                                         <p:tgtEl>
-                                          <p:spTgt spid="5">
+                                          <p:spTgt spid="7">
                                             <p:txEl>
                                               <p:pRg st="4" end="4"/>
                                             </p:txEl>
@@ -8251,57 +8792,13 @@
                                     </p:set>
                                     <p:animEffect transition="in" filter="fade">
                                       <p:cBhvr>
-                                        <p:cTn id="14" dur="500"/>
+                                        <p:cTn id="21" dur="500"/>
                                         <p:tgtEl>
-                                          <p:spTgt spid="5">
+                                          <p:spTgt spid="7">
                                             <p:txEl>
                                               <p:pRg st="4" end="4"/>
                                             </p:txEl>
                                           </p:spTgt>
-                                        </p:tgtEl>
-                                      </p:cBhvr>
-                                    </p:animEffect>
-                                  </p:childTnLst>
-                                </p:cTn>
-                              </p:par>
-                            </p:childTnLst>
-                          </p:cTn>
-                        </p:par>
-                        <p:par>
-                          <p:cTn id="15" fill="hold">
-                            <p:stCondLst>
-                              <p:cond delay="1000"/>
-                            </p:stCondLst>
-                            <p:childTnLst>
-                              <p:par>
-                                <p:cTn id="16" presetID="10" presetClass="entr" presetSubtype="0" fill="hold" nodeType="afterEffect">
-                                  <p:stCondLst>
-                                    <p:cond delay="0"/>
-                                  </p:stCondLst>
-                                  <p:childTnLst>
-                                    <p:set>
-                                      <p:cBhvr>
-                                        <p:cTn id="17" dur="1" fill="hold">
-                                          <p:stCondLst>
-                                            <p:cond delay="0"/>
-                                          </p:stCondLst>
-                                        </p:cTn>
-                                        <p:tgtEl>
-                                          <p:spTgt spid="6"/>
-                                        </p:tgtEl>
-                                        <p:attrNameLst>
-                                          <p:attrName>style.visibility</p:attrName>
-                                        </p:attrNameLst>
-                                      </p:cBhvr>
-                                      <p:to>
-                                        <p:strVal val="visible"/>
-                                      </p:to>
-                                    </p:set>
-                                    <p:animEffect transition="in" filter="fade">
-                                      <p:cBhvr>
-                                        <p:cTn id="18" dur="500"/>
-                                        <p:tgtEl>
-                                          <p:spTgt spid="6"/>
                                         </p:tgtEl>
                                       </p:cBhvr>
                                     </p:animEffect>
@@ -8336,9 +8833,114 @@
       </p:par>
     </p:tnLst>
     <p:bldLst>
-      <p:bldP spid="5" grpId="0" uiExpand="1" build="allAtOnce"/>
+      <p:bldP spid="7" grpId="0" uiExpand="1" build="p"/>
     </p:bldLst>
   </p:timing>
+</p:sld>
+</file>
+
+<file path=ppt/slides/slide9.xml><?xml version="1.0" encoding="utf-8"?>
+<p:sld xmlns:a="http://schemas.openxmlformats.org/drawingml/2006/main" xmlns:r="http://schemas.openxmlformats.org/officeDocument/2006/relationships" xmlns:p="http://schemas.openxmlformats.org/presentationml/2006/main">
+  <p:cSld>
+    <p:spTree>
+      <p:nvGrpSpPr>
+        <p:cNvPr id="1" name=""/>
+        <p:cNvGrpSpPr/>
+        <p:nvPr/>
+      </p:nvGrpSpPr>
+      <p:grpSpPr>
+        <a:xfrm>
+          <a:off x="0" y="0"/>
+          <a:ext cx="0" cy="0"/>
+          <a:chOff x="0" y="0"/>
+          <a:chExt cx="0" cy="0"/>
+        </a:xfrm>
+      </p:grpSpPr>
+      <p:pic>
+        <p:nvPicPr>
+          <p:cNvPr id="3" name="Imagem 2" descr="Uma imagem contendo texto, screenshot&#10;&#10;Descrição gerada automaticamente">
+            <a:extLst>
+              <a:ext uri="{FF2B5EF4-FFF2-40B4-BE49-F238E27FC236}">
+                <a16:creationId xmlns:a16="http://schemas.microsoft.com/office/drawing/2014/main" id="{6C938E71-B49B-4DEF-875F-557045C5151F}"/>
+              </a:ext>
+            </a:extLst>
+          </p:cNvPr>
+          <p:cNvPicPr>
+            <a:picLocks noChangeAspect="1"/>
+          </p:cNvPicPr>
+          <p:nvPr/>
+        </p:nvPicPr>
+        <p:blipFill>
+          <a:blip r:embed="rId2">
+            <a:extLst>
+              <a:ext uri="{28A0092B-C50C-407E-A947-70E740481C1C}">
+                <a14:useLocalDpi xmlns:a14="http://schemas.microsoft.com/office/drawing/2010/main" val="0"/>
+              </a:ext>
+            </a:extLst>
+          </a:blip>
+          <a:stretch>
+            <a:fillRect/>
+          </a:stretch>
+        </p:blipFill>
+        <p:spPr>
+          <a:xfrm>
+            <a:off x="13254" y="13252"/>
+            <a:ext cx="11463128" cy="6844748"/>
+          </a:xfrm>
+          <a:prstGeom prst="rect">
+            <a:avLst/>
+          </a:prstGeom>
+        </p:spPr>
+      </p:pic>
+      <p:pic>
+        <p:nvPicPr>
+          <p:cNvPr id="2" name="Imagem 1" descr="Tela de celular com texto preto sobre fundo branco&#10;&#10;Descrição gerada automaticamente">
+            <a:extLst>
+              <a:ext uri="{FF2B5EF4-FFF2-40B4-BE49-F238E27FC236}">
+                <a16:creationId xmlns:a16="http://schemas.microsoft.com/office/drawing/2014/main" id="{FE6D657B-2A33-4C56-B996-1A1EDE6494F2}"/>
+              </a:ext>
+            </a:extLst>
+          </p:cNvPr>
+          <p:cNvPicPr>
+            <a:picLocks noChangeAspect="1"/>
+          </p:cNvPicPr>
+          <p:nvPr/>
+        </p:nvPicPr>
+        <p:blipFill>
+          <a:blip r:embed="rId3">
+            <a:extLst>
+              <a:ext uri="{28A0092B-C50C-407E-A947-70E740481C1C}">
+                <a14:useLocalDpi xmlns:a14="http://schemas.microsoft.com/office/drawing/2010/main" val="0"/>
+              </a:ext>
+            </a:extLst>
+          </a:blip>
+          <a:stretch>
+            <a:fillRect/>
+          </a:stretch>
+        </p:blipFill>
+        <p:spPr>
+          <a:xfrm>
+            <a:off x="10363200" y="0"/>
+            <a:ext cx="1828800" cy="1828800"/>
+          </a:xfrm>
+          <a:prstGeom prst="rect">
+            <a:avLst/>
+          </a:prstGeom>
+        </p:spPr>
+      </p:pic>
+    </p:spTree>
+    <p:extLst>
+      <p:ext uri="{BB962C8B-B14F-4D97-AF65-F5344CB8AC3E}">
+        <p14:creationId xmlns:p14="http://schemas.microsoft.com/office/powerpoint/2010/main" val="2075578980"/>
+      </p:ext>
+    </p:extLst>
+  </p:cSld>
+  <p:clrMapOvr>
+    <a:masterClrMapping/>
+  </p:clrMapOvr>
+  <p:transition>
+    <p:fade/>
+  </p:transition>
 </p:sld>
 </file>
 

</xml_diff>